<commit_message>
creation base de donnée
</commit_message>
<xml_diff>
--- a/SCRUM/Présentation.pptx
+++ b/SCRUM/Présentation.pptx
@@ -4,19 +4,21 @@
   <p:sldMasterIdLst>
     <p:sldMasterId id="2147483648" r:id="rId1"/>
   </p:sldMasterIdLst>
+  <p:notesMasterIdLst>
+    <p:notesMasterId r:id="rId13"/>
+  </p:notesMasterIdLst>
   <p:sldIdLst>
     <p:sldId id="256" r:id="rId2"/>
     <p:sldId id="257" r:id="rId3"/>
     <p:sldId id="258" r:id="rId4"/>
     <p:sldId id="259" r:id="rId5"/>
     <p:sldId id="260" r:id="rId6"/>
-    <p:sldId id="261" r:id="rId7"/>
-    <p:sldId id="266" r:id="rId8"/>
-    <p:sldId id="262" r:id="rId9"/>
-    <p:sldId id="263" r:id="rId10"/>
-    <p:sldId id="267" r:id="rId11"/>
-    <p:sldId id="264" r:id="rId12"/>
-    <p:sldId id="265" r:id="rId13"/>
+    <p:sldId id="266" r:id="rId7"/>
+    <p:sldId id="262" r:id="rId8"/>
+    <p:sldId id="263" r:id="rId9"/>
+    <p:sldId id="267" r:id="rId10"/>
+    <p:sldId id="264" r:id="rId11"/>
+    <p:sldId id="265" r:id="rId12"/>
   </p:sldIdLst>
   <p:sldSz cx="9144000" cy="6858000" type="screen4x3"/>
   <p:notesSz cx="6858000" cy="9144000"/>
@@ -134,6 +136,440 @@
 </p:presentation>
 </file>
 
+<file path=ppt/notesMasters/notesMaster1.xml><?xml version="1.0" encoding="utf-8"?>
+<p:notesMaster xmlns:a="http://schemas.openxmlformats.org/drawingml/2006/main" xmlns:r="http://schemas.openxmlformats.org/officeDocument/2006/relationships" xmlns:p="http://schemas.openxmlformats.org/presentationml/2006/main">
+  <p:cSld>
+    <p:bg>
+      <p:bgRef idx="1001">
+        <a:schemeClr val="bg1"/>
+      </p:bgRef>
+    </p:bg>
+    <p:spTree>
+      <p:nvGrpSpPr>
+        <p:cNvPr id="1" name=""/>
+        <p:cNvGrpSpPr/>
+        <p:nvPr/>
+      </p:nvGrpSpPr>
+      <p:grpSpPr>
+        <a:xfrm>
+          <a:off x="0" y="0"/>
+          <a:ext cx="0" cy="0"/>
+          <a:chOff x="0" y="0"/>
+          <a:chExt cx="0" cy="0"/>
+        </a:xfrm>
+      </p:grpSpPr>
+      <p:sp>
+        <p:nvSpPr>
+          <p:cNvPr id="2" name="Espace réservé de l'en-tête 1"/>
+          <p:cNvSpPr>
+            <a:spLocks noGrp="1"/>
+          </p:cNvSpPr>
+          <p:nvPr>
+            <p:ph type="hdr" sz="quarter"/>
+          </p:nvPr>
+        </p:nvSpPr>
+        <p:spPr>
+          <a:xfrm>
+            <a:off x="0" y="0"/>
+            <a:ext cx="2971800" cy="458788"/>
+          </a:xfrm>
+          <a:prstGeom prst="rect">
+            <a:avLst/>
+          </a:prstGeom>
+        </p:spPr>
+        <p:txBody>
+          <a:bodyPr vert="horz" lIns="91440" tIns="45720" rIns="91440" bIns="45720" rtlCol="0"/>
+          <a:lstStyle>
+            <a:lvl1pPr algn="l">
+              <a:defRPr sz="1200"/>
+            </a:lvl1pPr>
+          </a:lstStyle>
+          <a:p>
+            <a:endParaRPr lang="fr-FR"/>
+          </a:p>
+        </p:txBody>
+      </p:sp>
+      <p:sp>
+        <p:nvSpPr>
+          <p:cNvPr id="3" name="Espace réservé de la date 2"/>
+          <p:cNvSpPr>
+            <a:spLocks noGrp="1"/>
+          </p:cNvSpPr>
+          <p:nvPr>
+            <p:ph type="dt" idx="1"/>
+          </p:nvPr>
+        </p:nvSpPr>
+        <p:spPr>
+          <a:xfrm>
+            <a:off x="3884613" y="0"/>
+            <a:ext cx="2971800" cy="458788"/>
+          </a:xfrm>
+          <a:prstGeom prst="rect">
+            <a:avLst/>
+          </a:prstGeom>
+        </p:spPr>
+        <p:txBody>
+          <a:bodyPr vert="horz" lIns="91440" tIns="45720" rIns="91440" bIns="45720" rtlCol="0"/>
+          <a:lstStyle>
+            <a:lvl1pPr algn="r">
+              <a:defRPr sz="1200"/>
+            </a:lvl1pPr>
+          </a:lstStyle>
+          <a:p>
+            <a:fld id="{2A84F088-5717-486C-8E6E-59BA7D1B1ECD}" type="datetimeFigureOut">
+              <a:rPr lang="fr-FR" smtClean="0"/>
+              <a:t>20/04/2018</a:t>
+            </a:fld>
+            <a:endParaRPr lang="fr-FR"/>
+          </a:p>
+        </p:txBody>
+      </p:sp>
+      <p:sp>
+        <p:nvSpPr>
+          <p:cNvPr id="4" name="Espace réservé de l'image des diapositives 3"/>
+          <p:cNvSpPr>
+            <a:spLocks noGrp="1" noRot="1" noChangeAspect="1"/>
+          </p:cNvSpPr>
+          <p:nvPr>
+            <p:ph type="sldImg" idx="2"/>
+          </p:nvPr>
+        </p:nvSpPr>
+        <p:spPr>
+          <a:xfrm>
+            <a:off x="1371600" y="1143000"/>
+            <a:ext cx="4114800" cy="3086100"/>
+          </a:xfrm>
+          <a:prstGeom prst="rect">
+            <a:avLst/>
+          </a:prstGeom>
+          <a:noFill/>
+          <a:ln w="12700">
+            <a:solidFill>
+              <a:prstClr val="black"/>
+            </a:solidFill>
+          </a:ln>
+        </p:spPr>
+        <p:txBody>
+          <a:bodyPr vert="horz" lIns="91440" tIns="45720" rIns="91440" bIns="45720" rtlCol="0" anchor="ctr"/>
+          <a:lstStyle/>
+          <a:p>
+            <a:endParaRPr lang="fr-FR"/>
+          </a:p>
+        </p:txBody>
+      </p:sp>
+      <p:sp>
+        <p:nvSpPr>
+          <p:cNvPr id="5" name="Espace réservé des commentaires 4"/>
+          <p:cNvSpPr>
+            <a:spLocks noGrp="1"/>
+          </p:cNvSpPr>
+          <p:nvPr>
+            <p:ph type="body" sz="quarter" idx="3"/>
+          </p:nvPr>
+        </p:nvSpPr>
+        <p:spPr>
+          <a:xfrm>
+            <a:off x="685800" y="4400550"/>
+            <a:ext cx="5486400" cy="3600450"/>
+          </a:xfrm>
+          <a:prstGeom prst="rect">
+            <a:avLst/>
+          </a:prstGeom>
+        </p:spPr>
+        <p:txBody>
+          <a:bodyPr vert="horz" lIns="91440" tIns="45720" rIns="91440" bIns="45720" rtlCol="0"/>
+          <a:lstStyle/>
+          <a:p>
+            <a:pPr lvl="0"/>
+            <a:r>
+              <a:rPr lang="fr-FR" smtClean="0"/>
+              <a:t>Modifiez les styles du texte du masque</a:t>
+            </a:r>
+          </a:p>
+          <a:p>
+            <a:pPr lvl="1"/>
+            <a:r>
+              <a:rPr lang="fr-FR" smtClean="0"/>
+              <a:t>Deuxième niveau</a:t>
+            </a:r>
+          </a:p>
+          <a:p>
+            <a:pPr lvl="2"/>
+            <a:r>
+              <a:rPr lang="fr-FR" smtClean="0"/>
+              <a:t>Troisième niveau</a:t>
+            </a:r>
+          </a:p>
+          <a:p>
+            <a:pPr lvl="3"/>
+            <a:r>
+              <a:rPr lang="fr-FR" smtClean="0"/>
+              <a:t>Quatrième niveau</a:t>
+            </a:r>
+          </a:p>
+          <a:p>
+            <a:pPr lvl="4"/>
+            <a:r>
+              <a:rPr lang="fr-FR" smtClean="0"/>
+              <a:t>Cinquième niveau</a:t>
+            </a:r>
+            <a:endParaRPr lang="fr-FR"/>
+          </a:p>
+        </p:txBody>
+      </p:sp>
+      <p:sp>
+        <p:nvSpPr>
+          <p:cNvPr id="6" name="Espace réservé du pied de page 5"/>
+          <p:cNvSpPr>
+            <a:spLocks noGrp="1"/>
+          </p:cNvSpPr>
+          <p:nvPr>
+            <p:ph type="ftr" sz="quarter" idx="4"/>
+          </p:nvPr>
+        </p:nvSpPr>
+        <p:spPr>
+          <a:xfrm>
+            <a:off x="0" y="8685213"/>
+            <a:ext cx="2971800" cy="458787"/>
+          </a:xfrm>
+          <a:prstGeom prst="rect">
+            <a:avLst/>
+          </a:prstGeom>
+        </p:spPr>
+        <p:txBody>
+          <a:bodyPr vert="horz" lIns="91440" tIns="45720" rIns="91440" bIns="45720" rtlCol="0" anchor="b"/>
+          <a:lstStyle>
+            <a:lvl1pPr algn="l">
+              <a:defRPr sz="1200"/>
+            </a:lvl1pPr>
+          </a:lstStyle>
+          <a:p>
+            <a:endParaRPr lang="fr-FR"/>
+          </a:p>
+        </p:txBody>
+      </p:sp>
+      <p:sp>
+        <p:nvSpPr>
+          <p:cNvPr id="7" name="Espace réservé du numéro de diapositive 6"/>
+          <p:cNvSpPr>
+            <a:spLocks noGrp="1"/>
+          </p:cNvSpPr>
+          <p:nvPr>
+            <p:ph type="sldNum" sz="quarter" idx="5"/>
+          </p:nvPr>
+        </p:nvSpPr>
+        <p:spPr>
+          <a:xfrm>
+            <a:off x="3884613" y="8685213"/>
+            <a:ext cx="2971800" cy="458787"/>
+          </a:xfrm>
+          <a:prstGeom prst="rect">
+            <a:avLst/>
+          </a:prstGeom>
+        </p:spPr>
+        <p:txBody>
+          <a:bodyPr vert="horz" lIns="91440" tIns="45720" rIns="91440" bIns="45720" rtlCol="0" anchor="b"/>
+          <a:lstStyle>
+            <a:lvl1pPr algn="r">
+              <a:defRPr sz="1200"/>
+            </a:lvl1pPr>
+          </a:lstStyle>
+          <a:p>
+            <a:fld id="{2A9152E7-7A9B-4553-BD3E-3031666F4742}" type="slidenum">
+              <a:rPr lang="fr-FR" smtClean="0"/>
+              <a:t>‹N°›</a:t>
+            </a:fld>
+            <a:endParaRPr lang="fr-FR"/>
+          </a:p>
+        </p:txBody>
+      </p:sp>
+    </p:spTree>
+    <p:extLst>
+      <p:ext uri="{BB962C8B-B14F-4D97-AF65-F5344CB8AC3E}">
+        <p14:creationId xmlns:p14="http://schemas.microsoft.com/office/powerpoint/2010/main" val="2768023309"/>
+      </p:ext>
+    </p:extLst>
+  </p:cSld>
+  <p:clrMap bg1="lt1" tx1="dk1" bg2="lt2" tx2="dk2" accent1="accent1" accent2="accent2" accent3="accent3" accent4="accent4" accent5="accent5" accent6="accent6" hlink="hlink" folHlink="folHlink"/>
+  <p:notesStyle>
+    <a:lvl1pPr marL="0" algn="l" defTabSz="914400" rtl="0" eaLnBrk="1" latinLnBrk="0" hangingPunct="1">
+      <a:defRPr sz="1200" kern="1200">
+        <a:solidFill>
+          <a:schemeClr val="tx1"/>
+        </a:solidFill>
+        <a:latin typeface="+mn-lt"/>
+        <a:ea typeface="+mn-ea"/>
+        <a:cs typeface="+mn-cs"/>
+      </a:defRPr>
+    </a:lvl1pPr>
+    <a:lvl2pPr marL="457200" algn="l" defTabSz="914400" rtl="0" eaLnBrk="1" latinLnBrk="0" hangingPunct="1">
+      <a:defRPr sz="1200" kern="1200">
+        <a:solidFill>
+          <a:schemeClr val="tx1"/>
+        </a:solidFill>
+        <a:latin typeface="+mn-lt"/>
+        <a:ea typeface="+mn-ea"/>
+        <a:cs typeface="+mn-cs"/>
+      </a:defRPr>
+    </a:lvl2pPr>
+    <a:lvl3pPr marL="914400" algn="l" defTabSz="914400" rtl="0" eaLnBrk="1" latinLnBrk="0" hangingPunct="1">
+      <a:defRPr sz="1200" kern="1200">
+        <a:solidFill>
+          <a:schemeClr val="tx1"/>
+        </a:solidFill>
+        <a:latin typeface="+mn-lt"/>
+        <a:ea typeface="+mn-ea"/>
+        <a:cs typeface="+mn-cs"/>
+      </a:defRPr>
+    </a:lvl3pPr>
+    <a:lvl4pPr marL="1371600" algn="l" defTabSz="914400" rtl="0" eaLnBrk="1" latinLnBrk="0" hangingPunct="1">
+      <a:defRPr sz="1200" kern="1200">
+        <a:solidFill>
+          <a:schemeClr val="tx1"/>
+        </a:solidFill>
+        <a:latin typeface="+mn-lt"/>
+        <a:ea typeface="+mn-ea"/>
+        <a:cs typeface="+mn-cs"/>
+      </a:defRPr>
+    </a:lvl4pPr>
+    <a:lvl5pPr marL="1828800" algn="l" defTabSz="914400" rtl="0" eaLnBrk="1" latinLnBrk="0" hangingPunct="1">
+      <a:defRPr sz="1200" kern="1200">
+        <a:solidFill>
+          <a:schemeClr val="tx1"/>
+        </a:solidFill>
+        <a:latin typeface="+mn-lt"/>
+        <a:ea typeface="+mn-ea"/>
+        <a:cs typeface="+mn-cs"/>
+      </a:defRPr>
+    </a:lvl5pPr>
+    <a:lvl6pPr marL="2286000" algn="l" defTabSz="914400" rtl="0" eaLnBrk="1" latinLnBrk="0" hangingPunct="1">
+      <a:defRPr sz="1200" kern="1200">
+        <a:solidFill>
+          <a:schemeClr val="tx1"/>
+        </a:solidFill>
+        <a:latin typeface="+mn-lt"/>
+        <a:ea typeface="+mn-ea"/>
+        <a:cs typeface="+mn-cs"/>
+      </a:defRPr>
+    </a:lvl6pPr>
+    <a:lvl7pPr marL="2743200" algn="l" defTabSz="914400" rtl="0" eaLnBrk="1" latinLnBrk="0" hangingPunct="1">
+      <a:defRPr sz="1200" kern="1200">
+        <a:solidFill>
+          <a:schemeClr val="tx1"/>
+        </a:solidFill>
+        <a:latin typeface="+mn-lt"/>
+        <a:ea typeface="+mn-ea"/>
+        <a:cs typeface="+mn-cs"/>
+      </a:defRPr>
+    </a:lvl7pPr>
+    <a:lvl8pPr marL="3200400" algn="l" defTabSz="914400" rtl="0" eaLnBrk="1" latinLnBrk="0" hangingPunct="1">
+      <a:defRPr sz="1200" kern="1200">
+        <a:solidFill>
+          <a:schemeClr val="tx1"/>
+        </a:solidFill>
+        <a:latin typeface="+mn-lt"/>
+        <a:ea typeface="+mn-ea"/>
+        <a:cs typeface="+mn-cs"/>
+      </a:defRPr>
+    </a:lvl8pPr>
+    <a:lvl9pPr marL="3657600" algn="l" defTabSz="914400" rtl="0" eaLnBrk="1" latinLnBrk="0" hangingPunct="1">
+      <a:defRPr sz="1200" kern="1200">
+        <a:solidFill>
+          <a:schemeClr val="tx1"/>
+        </a:solidFill>
+        <a:latin typeface="+mn-lt"/>
+        <a:ea typeface="+mn-ea"/>
+        <a:cs typeface="+mn-cs"/>
+      </a:defRPr>
+    </a:lvl9pPr>
+  </p:notesStyle>
+</p:notesMaster>
+</file>
+
+<file path=ppt/notesSlides/notesSlide1.xml><?xml version="1.0" encoding="utf-8"?>
+<p:notes xmlns:a="http://schemas.openxmlformats.org/drawingml/2006/main" xmlns:r="http://schemas.openxmlformats.org/officeDocument/2006/relationships" xmlns:p="http://schemas.openxmlformats.org/presentationml/2006/main">
+  <p:cSld>
+    <p:spTree>
+      <p:nvGrpSpPr>
+        <p:cNvPr id="1" name=""/>
+        <p:cNvGrpSpPr/>
+        <p:nvPr/>
+      </p:nvGrpSpPr>
+      <p:grpSpPr>
+        <a:xfrm>
+          <a:off x="0" y="0"/>
+          <a:ext cx="0" cy="0"/>
+          <a:chOff x="0" y="0"/>
+          <a:chExt cx="0" cy="0"/>
+        </a:xfrm>
+      </p:grpSpPr>
+      <p:sp>
+        <p:nvSpPr>
+          <p:cNvPr id="2" name="Espace réservé de l'image des diapositives 1"/>
+          <p:cNvSpPr>
+            <a:spLocks noGrp="1" noRot="1" noChangeAspect="1"/>
+          </p:cNvSpPr>
+          <p:nvPr>
+            <p:ph type="sldImg"/>
+          </p:nvPr>
+        </p:nvSpPr>
+        <p:spPr/>
+      </p:sp>
+      <p:sp>
+        <p:nvSpPr>
+          <p:cNvPr id="3" name="Espace réservé des commentaires 2"/>
+          <p:cNvSpPr>
+            <a:spLocks noGrp="1"/>
+          </p:cNvSpPr>
+          <p:nvPr>
+            <p:ph type="body" idx="1"/>
+          </p:nvPr>
+        </p:nvSpPr>
+        <p:spPr/>
+        <p:txBody>
+          <a:bodyPr/>
+          <a:lstStyle/>
+          <a:p>
+            <a:endParaRPr lang="fr-FR"/>
+          </a:p>
+        </p:txBody>
+      </p:sp>
+      <p:sp>
+        <p:nvSpPr>
+          <p:cNvPr id="4" name="Espace réservé du numéro de diapositive 3"/>
+          <p:cNvSpPr>
+            <a:spLocks noGrp="1"/>
+          </p:cNvSpPr>
+          <p:nvPr>
+            <p:ph type="sldNum" sz="quarter" idx="10"/>
+          </p:nvPr>
+        </p:nvSpPr>
+        <p:spPr/>
+        <p:txBody>
+          <a:bodyPr/>
+          <a:lstStyle/>
+          <a:p>
+            <a:fld id="{2A9152E7-7A9B-4553-BD3E-3031666F4742}" type="slidenum">
+              <a:rPr lang="fr-FR" smtClean="0"/>
+              <a:t>1</a:t>
+            </a:fld>
+            <a:endParaRPr lang="fr-FR"/>
+          </a:p>
+        </p:txBody>
+      </p:sp>
+    </p:spTree>
+    <p:extLst>
+      <p:ext uri="{BB962C8B-B14F-4D97-AF65-F5344CB8AC3E}">
+        <p14:creationId xmlns:p14="http://schemas.microsoft.com/office/powerpoint/2010/main" val="2549560540"/>
+      </p:ext>
+    </p:extLst>
+  </p:cSld>
+  <p:clrMapOvr>
+    <a:masterClrMapping/>
+  </p:clrMapOvr>
+</p:notes>
+</file>
+
 <file path=ppt/slideLayouts/slideLayout1.xml><?xml version="1.0" encoding="utf-8"?>
 <p:sldLayout xmlns:a="http://schemas.openxmlformats.org/drawingml/2006/main" xmlns:r="http://schemas.openxmlformats.org/officeDocument/2006/relationships" xmlns:p="http://schemas.openxmlformats.org/presentationml/2006/main" type="title" preserve="1">
   <p:cSld name="Diapositive de titre">
@@ -313,7 +749,7 @@
           <a:bodyPr/>
           <a:lstStyle/>
           <a:p>
-            <a:fld id="{AA309A6D-C09C-4548-B29A-6CF363A7E532}" type="datetimeFigureOut">
+            <a:fld id="{7F9A181B-6CE7-45B0-8E1B-330B96C63856}" type="datetime1">
               <a:rPr lang="fr-FR" smtClean="0"/>
               <a:t>20/04/2018</a:t>
             </a:fld>
@@ -478,7 +914,7 @@
           <a:bodyPr/>
           <a:lstStyle/>
           <a:p>
-            <a:fld id="{AA309A6D-C09C-4548-B29A-6CF363A7E532}" type="datetimeFigureOut">
+            <a:fld id="{02276D55-FD39-4BAF-8E70-A3A294E73351}" type="datetime1">
               <a:rPr lang="fr-FR" smtClean="0"/>
               <a:t>20/04/2018</a:t>
             </a:fld>
@@ -653,7 +1089,7 @@
           <a:bodyPr/>
           <a:lstStyle/>
           <a:p>
-            <a:fld id="{AA309A6D-C09C-4548-B29A-6CF363A7E532}" type="datetimeFigureOut">
+            <a:fld id="{359E71CC-A4F5-4608-AA9C-DF10A98FB406}" type="datetime1">
               <a:rPr lang="fr-FR" smtClean="0"/>
               <a:t>20/04/2018</a:t>
             </a:fld>
@@ -818,7 +1254,7 @@
           <a:bodyPr/>
           <a:lstStyle/>
           <a:p>
-            <a:fld id="{AA309A6D-C09C-4548-B29A-6CF363A7E532}" type="datetimeFigureOut">
+            <a:fld id="{C15DD3D0-7071-4515-801A-0898E32EC5E4}" type="datetime1">
               <a:rPr lang="fr-FR" smtClean="0"/>
               <a:t>20/04/2018</a:t>
             </a:fld>
@@ -1059,7 +1495,7 @@
           <a:bodyPr/>
           <a:lstStyle/>
           <a:p>
-            <a:fld id="{AA309A6D-C09C-4548-B29A-6CF363A7E532}" type="datetimeFigureOut">
+            <a:fld id="{07A4CC2E-27DB-41A2-BB07-36A3A85A50B7}" type="datetime1">
               <a:rPr lang="fr-FR" smtClean="0"/>
               <a:t>20/04/2018</a:t>
             </a:fld>
@@ -1342,7 +1778,7 @@
           <a:bodyPr/>
           <a:lstStyle/>
           <a:p>
-            <a:fld id="{AA309A6D-C09C-4548-B29A-6CF363A7E532}" type="datetimeFigureOut">
+            <a:fld id="{0AE4607D-6CBE-4C8A-92DF-065DA1B9FF11}" type="datetime1">
               <a:rPr lang="fr-FR" smtClean="0"/>
               <a:t>20/04/2018</a:t>
             </a:fld>
@@ -1759,7 +2195,7 @@
           <a:bodyPr/>
           <a:lstStyle/>
           <a:p>
-            <a:fld id="{AA309A6D-C09C-4548-B29A-6CF363A7E532}" type="datetimeFigureOut">
+            <a:fld id="{8D785312-B15D-4AD5-BF02-95D3F67775E0}" type="datetime1">
               <a:rPr lang="fr-FR" smtClean="0"/>
               <a:t>20/04/2018</a:t>
             </a:fld>
@@ -1872,7 +2308,7 @@
           <a:bodyPr/>
           <a:lstStyle/>
           <a:p>
-            <a:fld id="{AA309A6D-C09C-4548-B29A-6CF363A7E532}" type="datetimeFigureOut">
+            <a:fld id="{BB67788A-B3CD-4BEA-AD93-64CE72A8A505}" type="datetime1">
               <a:rPr lang="fr-FR" smtClean="0"/>
               <a:t>20/04/2018</a:t>
             </a:fld>
@@ -1962,7 +2398,7 @@
           <a:bodyPr/>
           <a:lstStyle/>
           <a:p>
-            <a:fld id="{AA309A6D-C09C-4548-B29A-6CF363A7E532}" type="datetimeFigureOut">
+            <a:fld id="{21E33D94-B33C-4FCD-AEF8-C90D52A49442}" type="datetime1">
               <a:rPr lang="fr-FR" smtClean="0"/>
               <a:t>20/04/2018</a:t>
             </a:fld>
@@ -2234,7 +2670,7 @@
           <a:bodyPr/>
           <a:lstStyle/>
           <a:p>
-            <a:fld id="{AA309A6D-C09C-4548-B29A-6CF363A7E532}" type="datetimeFigureOut">
+            <a:fld id="{AAF78AEC-CF4F-466F-8292-94800DBA8939}" type="datetime1">
               <a:rPr lang="fr-FR" smtClean="0"/>
               <a:t>20/04/2018</a:t>
             </a:fld>
@@ -2482,7 +2918,7 @@
           <a:bodyPr/>
           <a:lstStyle/>
           <a:p>
-            <a:fld id="{AA309A6D-C09C-4548-B29A-6CF363A7E532}" type="datetimeFigureOut">
+            <a:fld id="{AAB32EFF-ED77-4B40-8714-2596D55C20C5}" type="datetime1">
               <a:rPr lang="fr-FR" smtClean="0"/>
               <a:t>20/04/2018</a:t>
             </a:fld>
@@ -2708,7 +3144,7 @@
             </a:lvl1pPr>
           </a:lstStyle>
           <a:p>
-            <a:fld id="{AA309A6D-C09C-4548-B29A-6CF363A7E532}" type="datetimeFigureOut">
+            <a:fld id="{45AF4F2A-5C23-482C-AA81-203814F94AF2}" type="datetime1">
               <a:rPr lang="fr-FR" smtClean="0"/>
               <a:t>20/04/2018</a:t>
             </a:fld>
@@ -2810,6 +3246,7 @@
     <p:sldLayoutId id="2147483658" r:id="rId10"/>
     <p:sldLayoutId id="2147483659" r:id="rId11"/>
   </p:sldLayoutIdLst>
+  <p:hf hdr="0" ftr="0" dt="0"/>
   <p:txStyles>
     <p:titleStyle>
       <a:lvl1pPr algn="ctr" defTabSz="914400" rtl="0" eaLnBrk="1" latinLnBrk="0" hangingPunct="1">
@@ -3123,7 +3560,7 @@
           <p:nvPr/>
         </p:nvPicPr>
         <p:blipFill rotWithShape="1">
-          <a:blip r:embed="rId2" cstate="print">
+          <a:blip r:embed="rId3" cstate="print">
             <a:extLst>
               <a:ext uri="{28A0092B-C50C-407E-A947-70E740481C1C}">
                 <a14:useLocalDpi xmlns:a14="http://schemas.microsoft.com/office/drawing/2010/main" val="0"/>
@@ -3157,7 +3594,7 @@
           <p:nvPr/>
         </p:nvPicPr>
         <p:blipFill rotWithShape="1">
-          <a:blip r:embed="rId2">
+          <a:blip r:embed="rId3">
             <a:extLst>
               <a:ext uri="{28A0092B-C50C-407E-A947-70E740481C1C}">
                 <a14:useLocalDpi xmlns:a14="http://schemas.microsoft.com/office/drawing/2010/main" val="0"/>
@@ -3182,6 +3619,29 @@
           </a:ln>
         </p:spPr>
       </p:pic>
+      <p:sp>
+        <p:nvSpPr>
+          <p:cNvPr id="3" name="Espace réservé du numéro de diapositive 2"/>
+          <p:cNvSpPr>
+            <a:spLocks noGrp="1"/>
+          </p:cNvSpPr>
+          <p:nvPr>
+            <p:ph type="sldNum" sz="quarter" idx="12"/>
+          </p:nvPr>
+        </p:nvSpPr>
+        <p:spPr/>
+        <p:txBody>
+          <a:bodyPr/>
+          <a:lstStyle/>
+          <a:p>
+            <a:fld id="{CF4668DC-857F-487D-BFFA-8C0CA5037977}" type="slidenum">
+              <a:rPr lang="fr-BE" smtClean="0"/>
+              <a:t>1</a:t>
+            </a:fld>
+            <a:endParaRPr lang="fr-BE"/>
+          </a:p>
+        </p:txBody>
+      </p:sp>
     </p:spTree>
     <p:extLst>
       <p:ext uri="{BB962C8B-B14F-4D97-AF65-F5344CB8AC3E}">
@@ -3192,6 +3652,13 @@
   <p:clrMapOvr>
     <a:masterClrMapping/>
   </p:clrMapOvr>
+  <p:timing>
+    <p:tnLst>
+      <p:par>
+        <p:cTn id="1" dur="indefinite" restart="never" nodeType="tmRoot"/>
+      </p:par>
+    </p:tnLst>
+  </p:timing>
 </p:sld>
 </file>
 
@@ -3214,152 +3681,52 @@
       </p:grpSpPr>
       <p:sp>
         <p:nvSpPr>
-          <p:cNvPr id="2" name="Titre 1"/>
-          <p:cNvSpPr>
-            <a:spLocks noGrp="1"/>
-          </p:cNvSpPr>
-          <p:nvPr>
-            <p:ph type="title"/>
-          </p:nvPr>
-        </p:nvSpPr>
-        <p:spPr/>
-        <p:txBody>
-          <a:bodyPr/>
-          <a:lstStyle/>
-          <a:p>
-            <a:r>
-              <a:rPr lang="fr-FR" dirty="0" smtClean="0"/>
-              <a:t>II. Conception du projet</a:t>
-            </a:r>
-            <a:endParaRPr lang="fr-FR" dirty="0"/>
-          </a:p>
-        </p:txBody>
-      </p:sp>
-      <p:sp>
-        <p:nvSpPr>
-          <p:cNvPr id="3" name="Espace réservé du contenu 2"/>
-          <p:cNvSpPr>
-            <a:spLocks noGrp="1"/>
-          </p:cNvSpPr>
-          <p:nvPr>
-            <p:ph idx="1"/>
-          </p:nvPr>
-        </p:nvSpPr>
-        <p:spPr/>
-        <p:txBody>
-          <a:bodyPr/>
-          <a:lstStyle/>
-          <a:p>
-            <a:pPr marL="0" indent="0">
-              <a:buNone/>
-            </a:pPr>
-            <a:r>
-              <a:rPr lang="fr-FR" dirty="0" smtClean="0"/>
-              <a:t>3. Road </a:t>
-            </a:r>
-            <a:r>
-              <a:rPr lang="fr-FR" dirty="0" err="1" smtClean="0"/>
-              <a:t>Map</a:t>
-            </a:r>
-            <a:r>
-              <a:rPr lang="fr-FR" dirty="0" smtClean="0"/>
-              <a:t> du produit</a:t>
-            </a:r>
-            <a:endParaRPr lang="fr-FR" dirty="0"/>
-          </a:p>
-        </p:txBody>
-      </p:sp>
-      <p:pic>
-        <p:nvPicPr>
-          <p:cNvPr id="4" name="Image 3"/>
-          <p:cNvPicPr>
-            <a:picLocks noChangeAspect="1"/>
-          </p:cNvPicPr>
+          <p:cNvPr id="19" name="Organigramme : Disque magnétique 18"/>
+          <p:cNvSpPr/>
           <p:nvPr/>
-        </p:nvPicPr>
-        <p:blipFill rotWithShape="1">
-          <a:blip r:embed="rId2"/>
-          <a:srcRect l="5119" t="21433" r="77950" b="48603"/>
-          <a:stretch/>
-        </p:blipFill>
+        </p:nvSpPr>
         <p:spPr>
           <a:xfrm>
-            <a:off x="1473709" y="2718212"/>
-            <a:ext cx="3096344" cy="3082354"/>
+            <a:off x="6725056" y="2996952"/>
+            <a:ext cx="1512168" cy="2880320"/>
           </a:xfrm>
-          <a:prstGeom prst="rect">
+          <a:prstGeom prst="flowChartMagneticDisk">
             <a:avLst/>
           </a:prstGeom>
+          <a:solidFill>
+            <a:srgbClr val="80FFFF"/>
+          </a:solidFill>
+          <a:ln w="12700">
+            <a:solidFill>
+              <a:schemeClr val="tx1"/>
+            </a:solidFill>
+          </a:ln>
         </p:spPr>
-      </p:pic>
-      <p:sp>
-        <p:nvSpPr>
-          <p:cNvPr id="5" name="ZoneTexte 4"/>
-          <p:cNvSpPr txBox="1"/>
-          <p:nvPr/>
-        </p:nvSpPr>
-        <p:spPr>
-          <a:xfrm>
-            <a:off x="1547664" y="2348880"/>
-            <a:ext cx="4320480" cy="369332"/>
-          </a:xfrm>
-          <a:prstGeom prst="rect">
-            <a:avLst/>
-          </a:prstGeom>
-          <a:noFill/>
-        </p:spPr>
-        <p:txBody>
-          <a:bodyPr wrap="square" rtlCol="0">
-            <a:spAutoFit/>
-          </a:bodyPr>
-          <a:lstStyle/>
-          <a:p>
-            <a:r>
-              <a:rPr lang="fr-FR" dirty="0" smtClean="0"/>
-              <a:t>1 release pour </a:t>
-            </a:r>
-            <a:r>
-              <a:rPr lang="fr-FR" dirty="0" err="1" smtClean="0"/>
-              <a:t>Proxibanque</a:t>
-            </a:r>
-            <a:r>
-              <a:rPr lang="fr-FR" dirty="0" smtClean="0"/>
-              <a:t> V3</a:t>
-            </a:r>
-            <a:endParaRPr lang="fr-FR" dirty="0"/>
-          </a:p>
-        </p:txBody>
-      </p:sp>
-    </p:spTree>
-    <p:extLst>
-      <p:ext uri="{BB962C8B-B14F-4D97-AF65-F5344CB8AC3E}">
-        <p14:creationId xmlns:p14="http://schemas.microsoft.com/office/powerpoint/2010/main" val="3193640519"/>
-      </p:ext>
-    </p:extLst>
-  </p:cSld>
-  <p:clrMapOvr>
-    <a:masterClrMapping/>
-  </p:clrMapOvr>
-</p:sld>
-</file>
-
-<file path=ppt/slides/slide11.xml><?xml version="1.0" encoding="utf-8"?>
-<p:sld xmlns:a="http://schemas.openxmlformats.org/drawingml/2006/main" xmlns:r="http://schemas.openxmlformats.org/officeDocument/2006/relationships" xmlns:p="http://schemas.openxmlformats.org/presentationml/2006/main">
-  <p:cSld>
-    <p:spTree>
-      <p:nvGrpSpPr>
-        <p:cNvPr id="1" name=""/>
-        <p:cNvGrpSpPr/>
-        <p:nvPr/>
-      </p:nvGrpSpPr>
-      <p:grpSpPr>
-        <a:xfrm>
-          <a:off x="0" y="0"/>
-          <a:ext cx="0" cy="0"/>
-          <a:chOff x="0" y="0"/>
-          <a:chExt cx="0" cy="0"/>
-        </a:xfrm>
-      </p:grpSpPr>
+        <p:style>
+          <a:lnRef idx="2">
+            <a:schemeClr val="accent1">
+              <a:shade val="50000"/>
+            </a:schemeClr>
+          </a:lnRef>
+          <a:fillRef idx="1">
+            <a:schemeClr val="accent1"/>
+          </a:fillRef>
+          <a:effectRef idx="0">
+            <a:schemeClr val="accent1"/>
+          </a:effectRef>
+          <a:fontRef idx="minor">
+            <a:schemeClr val="lt1"/>
+          </a:fontRef>
+        </p:style>
+        <p:txBody>
+          <a:bodyPr rtlCol="0" anchor="ctr"/>
+          <a:lstStyle/>
+          <a:p>
+            <a:pPr algn="ctr"/>
+            <a:endParaRPr lang="fr-FR"/>
+          </a:p>
+        </p:txBody>
+      </p:sp>
       <p:sp>
         <p:nvSpPr>
           <p:cNvPr id="2" name="Titre 1"/>
@@ -3417,7 +3784,7 @@
         </p:nvSpPr>
         <p:spPr>
           <a:xfrm>
-            <a:off x="1403649" y="2996952"/>
+            <a:off x="1846927" y="2996952"/>
             <a:ext cx="1497512" cy="2880320"/>
           </a:xfrm>
           <a:prstGeom prst="rect">
@@ -3465,7 +3832,7 @@
         </p:nvSpPr>
         <p:spPr>
           <a:xfrm>
-            <a:off x="1399741" y="2350621"/>
+            <a:off x="1843019" y="2350621"/>
             <a:ext cx="1497513" cy="646331"/>
           </a:xfrm>
           <a:prstGeom prst="rect">
@@ -3496,7 +3863,7 @@
         </p:nvSpPr>
         <p:spPr>
           <a:xfrm>
-            <a:off x="1403649" y="2996952"/>
+            <a:off x="1846927" y="2996952"/>
             <a:ext cx="1497512" cy="646331"/>
           </a:xfrm>
           <a:prstGeom prst="rect">
@@ -3534,8 +3901,8 @@
         </p:nvSpPr>
         <p:spPr>
           <a:xfrm>
-            <a:off x="1403649" y="4077072"/>
-            <a:ext cx="1497512" cy="923330"/>
+            <a:off x="1838595" y="4052971"/>
+            <a:ext cx="1497512" cy="1200329"/>
           </a:xfrm>
           <a:prstGeom prst="rect">
             <a:avLst/>
@@ -3556,6 +3923,10 @@
           </a:p>
           <a:p>
             <a:pPr algn="ctr"/>
+            <a:endParaRPr lang="fr-FR" dirty="0" smtClean="0"/>
+          </a:p>
+          <a:p>
+            <a:pPr algn="ctr"/>
             <a:r>
               <a:rPr lang="fr-FR" dirty="0" smtClean="0"/>
               <a:t>Serveur </a:t>
@@ -3576,7 +3947,7 @@
         </p:nvSpPr>
         <p:spPr>
           <a:xfrm>
-            <a:off x="3347864" y="2996952"/>
+            <a:off x="3791142" y="2996952"/>
             <a:ext cx="2376265" cy="2880320"/>
           </a:xfrm>
           <a:prstGeom prst="rect">
@@ -3626,7 +3997,7 @@
         </p:nvSpPr>
         <p:spPr>
           <a:xfrm>
-            <a:off x="3343956" y="2478157"/>
+            <a:off x="3787234" y="2478157"/>
             <a:ext cx="2376267" cy="369332"/>
           </a:xfrm>
           <a:prstGeom prst="rect">
@@ -3657,7 +4028,7 @@
         </p:nvSpPr>
         <p:spPr>
           <a:xfrm>
-            <a:off x="3347863" y="2996952"/>
+            <a:off x="3791141" y="2996952"/>
             <a:ext cx="2376266" cy="646331"/>
           </a:xfrm>
           <a:prstGeom prst="rect">
@@ -3695,7 +4066,7 @@
         </p:nvSpPr>
         <p:spPr>
           <a:xfrm>
-            <a:off x="3347863" y="3717032"/>
+            <a:off x="3791141" y="3717032"/>
             <a:ext cx="2376266" cy="2031325"/>
           </a:xfrm>
           <a:prstGeom prst="rect">
@@ -3771,22 +4142,280 @@
       </p:sp>
       <p:sp>
         <p:nvSpPr>
-          <p:cNvPr id="12" name="Rectangle 11"/>
-          <p:cNvSpPr/>
+          <p:cNvPr id="13" name="ZoneTexte 12"/>
+          <p:cNvSpPr txBox="1"/>
           <p:nvPr/>
         </p:nvSpPr>
         <p:spPr>
           <a:xfrm>
-            <a:off x="6300193" y="2996952"/>
-            <a:ext cx="1497512" cy="2880320"/>
+            <a:off x="6739563" y="2350621"/>
+            <a:ext cx="1497513" cy="646331"/>
           </a:xfrm>
           <a:prstGeom prst="rect">
             <a:avLst/>
           </a:prstGeom>
-          <a:solidFill>
-            <a:srgbClr val="80FFFF"/>
-          </a:solidFill>
-          <a:ln w="12700">
+          <a:noFill/>
+        </p:spPr>
+        <p:txBody>
+          <a:bodyPr wrap="square" rtlCol="0">
+            <a:spAutoFit/>
+          </a:bodyPr>
+          <a:lstStyle/>
+          <a:p>
+            <a:pPr algn="ctr"/>
+            <a:r>
+              <a:rPr lang="fr-FR" dirty="0" smtClean="0"/>
+              <a:t>Stockage des données</a:t>
+            </a:r>
+            <a:endParaRPr lang="fr-FR" dirty="0"/>
+          </a:p>
+        </p:txBody>
+      </p:sp>
+      <p:sp>
+        <p:nvSpPr>
+          <p:cNvPr id="14" name="ZoneTexte 13"/>
+          <p:cNvSpPr txBox="1"/>
+          <p:nvPr/>
+        </p:nvSpPr>
+        <p:spPr>
+          <a:xfrm>
+            <a:off x="6746896" y="3107575"/>
+            <a:ext cx="1497512" cy="646331"/>
+          </a:xfrm>
+          <a:prstGeom prst="rect">
+            <a:avLst/>
+          </a:prstGeom>
+          <a:noFill/>
+        </p:spPr>
+        <p:txBody>
+          <a:bodyPr wrap="square" rtlCol="0">
+            <a:spAutoFit/>
+          </a:bodyPr>
+          <a:lstStyle/>
+          <a:p>
+            <a:pPr algn="ctr"/>
+            <a:r>
+              <a:rPr lang="fr-FR" b="1" dirty="0" smtClean="0"/>
+              <a:t>Base de données</a:t>
+            </a:r>
+            <a:endParaRPr lang="fr-FR" b="1" dirty="0"/>
+          </a:p>
+        </p:txBody>
+      </p:sp>
+      <p:sp>
+        <p:nvSpPr>
+          <p:cNvPr id="15" name="ZoneTexte 14"/>
+          <p:cNvSpPr txBox="1"/>
+          <p:nvPr/>
+        </p:nvSpPr>
+        <p:spPr>
+          <a:xfrm>
+            <a:off x="6765085" y="4446257"/>
+            <a:ext cx="1497512" cy="369332"/>
+          </a:xfrm>
+          <a:prstGeom prst="rect">
+            <a:avLst/>
+          </a:prstGeom>
+          <a:noFill/>
+        </p:spPr>
+        <p:txBody>
+          <a:bodyPr wrap="square" rtlCol="0">
+            <a:spAutoFit/>
+          </a:bodyPr>
+          <a:lstStyle/>
+          <a:p>
+            <a:pPr algn="ctr"/>
+            <a:r>
+              <a:rPr lang="fr-FR" dirty="0" smtClean="0"/>
+              <a:t>MySQL</a:t>
+            </a:r>
+            <a:endParaRPr lang="fr-FR" dirty="0"/>
+          </a:p>
+        </p:txBody>
+      </p:sp>
+      <p:sp>
+        <p:nvSpPr>
+          <p:cNvPr id="16" name="Espace réservé du numéro de diapositive 15"/>
+          <p:cNvSpPr>
+            <a:spLocks noGrp="1"/>
+          </p:cNvSpPr>
+          <p:nvPr>
+            <p:ph type="sldNum" sz="quarter" idx="12"/>
+          </p:nvPr>
+        </p:nvSpPr>
+        <p:spPr/>
+        <p:txBody>
+          <a:bodyPr/>
+          <a:lstStyle/>
+          <a:p>
+            <a:fld id="{CF4668DC-857F-487D-BFFA-8C0CA5037977}" type="slidenum">
+              <a:rPr lang="fr-BE" smtClean="0"/>
+              <a:t>10</a:t>
+            </a:fld>
+            <a:endParaRPr lang="fr-BE"/>
+          </a:p>
+        </p:txBody>
+      </p:sp>
+      <p:cxnSp>
+        <p:nvCxnSpPr>
+          <p:cNvPr id="21" name="Connecteur droit avec flèche 20"/>
+          <p:cNvCxnSpPr/>
+          <p:nvPr/>
+        </p:nvCxnSpPr>
+        <p:spPr>
+          <a:xfrm>
+            <a:off x="6023390" y="4538737"/>
+            <a:ext cx="864096" cy="0"/>
+          </a:xfrm>
+          <a:prstGeom prst="straightConnector1">
+            <a:avLst/>
+          </a:prstGeom>
+          <a:ln>
+            <a:solidFill>
+              <a:schemeClr val="tx1"/>
+            </a:solidFill>
+            <a:tailEnd type="triangle"/>
+          </a:ln>
+        </p:spPr>
+        <p:style>
+          <a:lnRef idx="1">
+            <a:schemeClr val="accent1"/>
+          </a:lnRef>
+          <a:fillRef idx="0">
+            <a:schemeClr val="accent1"/>
+          </a:fillRef>
+          <a:effectRef idx="0">
+            <a:schemeClr val="accent1"/>
+          </a:effectRef>
+          <a:fontRef idx="minor">
+            <a:schemeClr val="tx1"/>
+          </a:fontRef>
+        </p:style>
+      </p:cxnSp>
+      <p:cxnSp>
+        <p:nvCxnSpPr>
+          <p:cNvPr id="23" name="Connecteur droit avec flèche 22"/>
+          <p:cNvCxnSpPr/>
+          <p:nvPr/>
+        </p:nvCxnSpPr>
+        <p:spPr>
+          <a:xfrm flipH="1">
+            <a:off x="6023390" y="4721202"/>
+            <a:ext cx="864096" cy="0"/>
+          </a:xfrm>
+          <a:prstGeom prst="straightConnector1">
+            <a:avLst/>
+          </a:prstGeom>
+          <a:ln>
+            <a:solidFill>
+              <a:schemeClr val="tx1"/>
+            </a:solidFill>
+            <a:tailEnd type="triangle"/>
+          </a:ln>
+        </p:spPr>
+        <p:style>
+          <a:lnRef idx="1">
+            <a:schemeClr val="accent1"/>
+          </a:lnRef>
+          <a:fillRef idx="0">
+            <a:schemeClr val="accent1"/>
+          </a:fillRef>
+          <a:effectRef idx="0">
+            <a:schemeClr val="accent1"/>
+          </a:effectRef>
+          <a:fontRef idx="minor">
+            <a:schemeClr val="tx1"/>
+          </a:fontRef>
+        </p:style>
+      </p:cxnSp>
+      <p:cxnSp>
+        <p:nvCxnSpPr>
+          <p:cNvPr id="24" name="Connecteur droit avec flèche 23"/>
+          <p:cNvCxnSpPr/>
+          <p:nvPr/>
+        </p:nvCxnSpPr>
+        <p:spPr>
+          <a:xfrm>
+            <a:off x="3143070" y="4470671"/>
+            <a:ext cx="864096" cy="0"/>
+          </a:xfrm>
+          <a:prstGeom prst="straightConnector1">
+            <a:avLst/>
+          </a:prstGeom>
+          <a:ln>
+            <a:solidFill>
+              <a:schemeClr val="tx1"/>
+            </a:solidFill>
+            <a:tailEnd type="triangle"/>
+          </a:ln>
+        </p:spPr>
+        <p:style>
+          <a:lnRef idx="1">
+            <a:schemeClr val="accent1"/>
+          </a:lnRef>
+          <a:fillRef idx="0">
+            <a:schemeClr val="accent1"/>
+          </a:fillRef>
+          <a:effectRef idx="0">
+            <a:schemeClr val="accent1"/>
+          </a:effectRef>
+          <a:fontRef idx="minor">
+            <a:schemeClr val="tx1"/>
+          </a:fontRef>
+        </p:style>
+      </p:cxnSp>
+      <p:cxnSp>
+        <p:nvCxnSpPr>
+          <p:cNvPr id="25" name="Connecteur droit avec flèche 24"/>
+          <p:cNvCxnSpPr/>
+          <p:nvPr/>
+        </p:nvCxnSpPr>
+        <p:spPr>
+          <a:xfrm flipH="1">
+            <a:off x="3143070" y="4653136"/>
+            <a:ext cx="864096" cy="0"/>
+          </a:xfrm>
+          <a:prstGeom prst="straightConnector1">
+            <a:avLst/>
+          </a:prstGeom>
+          <a:ln>
+            <a:solidFill>
+              <a:schemeClr val="tx1"/>
+            </a:solidFill>
+            <a:tailEnd type="triangle"/>
+          </a:ln>
+        </p:spPr>
+        <p:style>
+          <a:lnRef idx="1">
+            <a:schemeClr val="accent1"/>
+          </a:lnRef>
+          <a:fillRef idx="0">
+            <a:schemeClr val="accent1"/>
+          </a:fillRef>
+          <a:effectRef idx="0">
+            <a:schemeClr val="accent1"/>
+          </a:effectRef>
+          <a:fontRef idx="minor">
+            <a:schemeClr val="tx1"/>
+          </a:fontRef>
+        </p:style>
+      </p:cxnSp>
+      <p:sp>
+        <p:nvSpPr>
+          <p:cNvPr id="26" name="Ellipse 25"/>
+          <p:cNvSpPr/>
+          <p:nvPr/>
+        </p:nvSpPr>
+        <p:spPr>
+          <a:xfrm>
+            <a:off x="745233" y="3501008"/>
+            <a:ext cx="432048" cy="432048"/>
+          </a:xfrm>
+          <a:prstGeom prst="ellipse">
+            <a:avLst/>
+          </a:prstGeom>
+          <a:noFill/>
+          <a:ln w="28575">
             <a:solidFill>
               <a:schemeClr val="tx1"/>
             </a:solidFill>
@@ -3817,16 +4446,263 @@
           </a:p>
         </p:txBody>
       </p:sp>
-      <p:sp>
-        <p:nvSpPr>
-          <p:cNvPr id="13" name="ZoneTexte 12"/>
+      <p:cxnSp>
+        <p:nvCxnSpPr>
+          <p:cNvPr id="30" name="Connecteur droit 29"/>
+          <p:cNvCxnSpPr/>
+          <p:nvPr/>
+        </p:nvCxnSpPr>
+        <p:spPr>
+          <a:xfrm>
+            <a:off x="954073" y="3936504"/>
+            <a:ext cx="0" cy="1063898"/>
+          </a:xfrm>
+          <a:prstGeom prst="line">
+            <a:avLst/>
+          </a:prstGeom>
+          <a:ln w="28575">
+            <a:solidFill>
+              <a:schemeClr val="tx1"/>
+            </a:solidFill>
+          </a:ln>
+        </p:spPr>
+        <p:style>
+          <a:lnRef idx="1">
+            <a:schemeClr val="accent1"/>
+          </a:lnRef>
+          <a:fillRef idx="0">
+            <a:schemeClr val="accent1"/>
+          </a:fillRef>
+          <a:effectRef idx="0">
+            <a:schemeClr val="accent1"/>
+          </a:effectRef>
+          <a:fontRef idx="minor">
+            <a:schemeClr val="tx1"/>
+          </a:fontRef>
+        </p:style>
+      </p:cxnSp>
+      <p:cxnSp>
+        <p:nvCxnSpPr>
+          <p:cNvPr id="33" name="Connecteur droit 32"/>
+          <p:cNvCxnSpPr/>
+          <p:nvPr/>
+        </p:nvCxnSpPr>
+        <p:spPr>
+          <a:xfrm>
+            <a:off x="954073" y="4149080"/>
+            <a:ext cx="316789" cy="288032"/>
+          </a:xfrm>
+          <a:prstGeom prst="line">
+            <a:avLst/>
+          </a:prstGeom>
+          <a:ln w="28575">
+            <a:solidFill>
+              <a:schemeClr val="tx1"/>
+            </a:solidFill>
+          </a:ln>
+        </p:spPr>
+        <p:style>
+          <a:lnRef idx="1">
+            <a:schemeClr val="accent1"/>
+          </a:lnRef>
+          <a:fillRef idx="0">
+            <a:schemeClr val="accent1"/>
+          </a:fillRef>
+          <a:effectRef idx="0">
+            <a:schemeClr val="accent1"/>
+          </a:effectRef>
+          <a:fontRef idx="minor">
+            <a:schemeClr val="tx1"/>
+          </a:fontRef>
+        </p:style>
+      </p:cxnSp>
+      <p:cxnSp>
+        <p:nvCxnSpPr>
+          <p:cNvPr id="34" name="Connecteur droit 33"/>
+          <p:cNvCxnSpPr/>
+          <p:nvPr/>
+        </p:nvCxnSpPr>
+        <p:spPr>
+          <a:xfrm>
+            <a:off x="957289" y="4971480"/>
+            <a:ext cx="316789" cy="288032"/>
+          </a:xfrm>
+          <a:prstGeom prst="line">
+            <a:avLst/>
+          </a:prstGeom>
+          <a:ln w="28575">
+            <a:solidFill>
+              <a:schemeClr val="tx1"/>
+            </a:solidFill>
+          </a:ln>
+        </p:spPr>
+        <p:style>
+          <a:lnRef idx="1">
+            <a:schemeClr val="accent1"/>
+          </a:lnRef>
+          <a:fillRef idx="0">
+            <a:schemeClr val="accent1"/>
+          </a:fillRef>
+          <a:effectRef idx="0">
+            <a:schemeClr val="accent1"/>
+          </a:effectRef>
+          <a:fontRef idx="minor">
+            <a:schemeClr val="tx1"/>
+          </a:fontRef>
+        </p:style>
+      </p:cxnSp>
+      <p:cxnSp>
+        <p:nvCxnSpPr>
+          <p:cNvPr id="35" name="Connecteur droit 34"/>
+          <p:cNvCxnSpPr/>
+          <p:nvPr/>
+        </p:nvCxnSpPr>
+        <p:spPr>
+          <a:xfrm flipH="1">
+            <a:off x="651203" y="4979554"/>
+            <a:ext cx="316789" cy="288032"/>
+          </a:xfrm>
+          <a:prstGeom prst="line">
+            <a:avLst/>
+          </a:prstGeom>
+          <a:ln w="28575">
+            <a:solidFill>
+              <a:schemeClr val="tx1"/>
+            </a:solidFill>
+          </a:ln>
+        </p:spPr>
+        <p:style>
+          <a:lnRef idx="1">
+            <a:schemeClr val="accent1"/>
+          </a:lnRef>
+          <a:fillRef idx="0">
+            <a:schemeClr val="accent1"/>
+          </a:fillRef>
+          <a:effectRef idx="0">
+            <a:schemeClr val="accent1"/>
+          </a:effectRef>
+          <a:fontRef idx="minor">
+            <a:schemeClr val="tx1"/>
+          </a:fontRef>
+        </p:style>
+      </p:cxnSp>
+      <p:cxnSp>
+        <p:nvCxnSpPr>
+          <p:cNvPr id="36" name="Connecteur droit 35"/>
+          <p:cNvCxnSpPr/>
+          <p:nvPr/>
+        </p:nvCxnSpPr>
+        <p:spPr>
+          <a:xfrm flipH="1">
+            <a:off x="659535" y="4141006"/>
+            <a:ext cx="316789" cy="288032"/>
+          </a:xfrm>
+          <a:prstGeom prst="line">
+            <a:avLst/>
+          </a:prstGeom>
+          <a:ln w="28575">
+            <a:solidFill>
+              <a:schemeClr val="tx1"/>
+            </a:solidFill>
+          </a:ln>
+        </p:spPr>
+        <p:style>
+          <a:lnRef idx="1">
+            <a:schemeClr val="accent1"/>
+          </a:lnRef>
+          <a:fillRef idx="0">
+            <a:schemeClr val="accent1"/>
+          </a:fillRef>
+          <a:effectRef idx="0">
+            <a:schemeClr val="accent1"/>
+          </a:effectRef>
+          <a:fontRef idx="minor">
+            <a:schemeClr val="tx1"/>
+          </a:fontRef>
+        </p:style>
+      </p:cxnSp>
+      <p:cxnSp>
+        <p:nvCxnSpPr>
+          <p:cNvPr id="37" name="Connecteur droit avec flèche 36"/>
+          <p:cNvCxnSpPr/>
+          <p:nvPr/>
+        </p:nvCxnSpPr>
+        <p:spPr>
+          <a:xfrm>
+            <a:off x="1270862" y="4486493"/>
+            <a:ext cx="864096" cy="0"/>
+          </a:xfrm>
+          <a:prstGeom prst="straightConnector1">
+            <a:avLst/>
+          </a:prstGeom>
+          <a:ln>
+            <a:solidFill>
+              <a:schemeClr val="tx1"/>
+            </a:solidFill>
+            <a:tailEnd type="triangle"/>
+          </a:ln>
+        </p:spPr>
+        <p:style>
+          <a:lnRef idx="1">
+            <a:schemeClr val="accent1"/>
+          </a:lnRef>
+          <a:fillRef idx="0">
+            <a:schemeClr val="accent1"/>
+          </a:fillRef>
+          <a:effectRef idx="0">
+            <a:schemeClr val="accent1"/>
+          </a:effectRef>
+          <a:fontRef idx="minor">
+            <a:schemeClr val="tx1"/>
+          </a:fontRef>
+        </p:style>
+      </p:cxnSp>
+      <p:cxnSp>
+        <p:nvCxnSpPr>
+          <p:cNvPr id="38" name="Connecteur droit avec flèche 37"/>
+          <p:cNvCxnSpPr/>
+          <p:nvPr/>
+        </p:nvCxnSpPr>
+        <p:spPr>
+          <a:xfrm flipH="1">
+            <a:off x="1270862" y="4668958"/>
+            <a:ext cx="864096" cy="0"/>
+          </a:xfrm>
+          <a:prstGeom prst="straightConnector1">
+            <a:avLst/>
+          </a:prstGeom>
+          <a:ln>
+            <a:solidFill>
+              <a:schemeClr val="tx1"/>
+            </a:solidFill>
+            <a:tailEnd type="triangle"/>
+          </a:ln>
+        </p:spPr>
+        <p:style>
+          <a:lnRef idx="1">
+            <a:schemeClr val="accent1"/>
+          </a:lnRef>
+          <a:fillRef idx="0">
+            <a:schemeClr val="accent1"/>
+          </a:fillRef>
+          <a:effectRef idx="0">
+            <a:schemeClr val="accent1"/>
+          </a:effectRef>
+          <a:fontRef idx="minor">
+            <a:schemeClr val="tx1"/>
+          </a:fontRef>
+        </p:style>
+      </p:cxnSp>
+      <p:sp>
+        <p:nvSpPr>
+          <p:cNvPr id="39" name="ZoneTexte 38"/>
           <p:cNvSpPr txBox="1"/>
           <p:nvPr/>
         </p:nvSpPr>
         <p:spPr>
           <a:xfrm>
-            <a:off x="6296285" y="2350621"/>
-            <a:ext cx="1497513" cy="646331"/>
+            <a:off x="267883" y="2478157"/>
+            <a:ext cx="1497513" cy="369332"/>
           </a:xfrm>
           <a:prstGeom prst="rect">
             <a:avLst/>
@@ -3842,69 +4718,7 @@
             <a:pPr algn="ctr"/>
             <a:r>
               <a:rPr lang="fr-FR" dirty="0" smtClean="0"/>
-              <a:t>Stockage des données</a:t>
-            </a:r>
-            <a:endParaRPr lang="fr-FR" dirty="0"/>
-          </a:p>
-        </p:txBody>
-      </p:sp>
-      <p:sp>
-        <p:nvSpPr>
-          <p:cNvPr id="14" name="ZoneTexte 13"/>
-          <p:cNvSpPr txBox="1"/>
-          <p:nvPr/>
-        </p:nvSpPr>
-        <p:spPr>
-          <a:xfrm>
-            <a:off x="6300193" y="2996952"/>
-            <a:ext cx="1497512" cy="646331"/>
-          </a:xfrm>
-          <a:prstGeom prst="rect">
-            <a:avLst/>
-          </a:prstGeom>
-          <a:noFill/>
-        </p:spPr>
-        <p:txBody>
-          <a:bodyPr wrap="square" rtlCol="0">
-            <a:spAutoFit/>
-          </a:bodyPr>
-          <a:lstStyle/>
-          <a:p>
-            <a:pPr algn="ctr"/>
-            <a:r>
-              <a:rPr lang="fr-FR" b="1" dirty="0" smtClean="0"/>
-              <a:t>Base de données</a:t>
-            </a:r>
-            <a:endParaRPr lang="fr-FR" b="1" dirty="0"/>
-          </a:p>
-        </p:txBody>
-      </p:sp>
-      <p:sp>
-        <p:nvSpPr>
-          <p:cNvPr id="15" name="ZoneTexte 14"/>
-          <p:cNvSpPr txBox="1"/>
-          <p:nvPr/>
-        </p:nvSpPr>
-        <p:spPr>
-          <a:xfrm>
-            <a:off x="6300193" y="4077072"/>
-            <a:ext cx="1497512" cy="369332"/>
-          </a:xfrm>
-          <a:prstGeom prst="rect">
-            <a:avLst/>
-          </a:prstGeom>
-          <a:noFill/>
-        </p:spPr>
-        <p:txBody>
-          <a:bodyPr wrap="square" rtlCol="0">
-            <a:spAutoFit/>
-          </a:bodyPr>
-          <a:lstStyle/>
-          <a:p>
-            <a:pPr algn="ctr"/>
-            <a:r>
-              <a:rPr lang="fr-FR" dirty="0" smtClean="0"/>
-              <a:t>MySQL</a:t>
+              <a:t>utilisateur</a:t>
             </a:r>
             <a:endParaRPr lang="fr-FR" dirty="0"/>
           </a:p>
@@ -3920,10 +4734,17 @@
   <p:clrMapOvr>
     <a:masterClrMapping/>
   </p:clrMapOvr>
+  <p:timing>
+    <p:tnLst>
+      <p:par>
+        <p:cTn id="1" dur="indefinite" restart="never" nodeType="tmRoot"/>
+      </p:par>
+    </p:tnLst>
+  </p:timing>
 </p:sld>
 </file>
 
-<file path=ppt/slides/slide12.xml><?xml version="1.0" encoding="utf-8"?>
+<file path=ppt/slides/slide11.xml><?xml version="1.0" encoding="utf-8"?>
 <p:sld xmlns:a="http://schemas.openxmlformats.org/drawingml/2006/main" xmlns:r="http://schemas.openxmlformats.org/officeDocument/2006/relationships" xmlns:p="http://schemas.openxmlformats.org/presentationml/2006/main">
   <p:cSld>
     <p:spTree>
@@ -4004,7 +4825,7 @@
         </p:blipFill>
         <p:spPr>
           <a:xfrm>
-            <a:off x="863588" y="2780928"/>
+            <a:off x="863588" y="3029819"/>
             <a:ext cx="7416824" cy="3096344"/>
           </a:xfrm>
           <a:prstGeom prst="rect">
@@ -4020,7 +4841,7 @@
         </p:nvSpPr>
         <p:spPr>
           <a:xfrm>
-            <a:off x="864629" y="2229034"/>
+            <a:off x="864629" y="2267580"/>
             <a:ext cx="4320480" cy="369332"/>
           </a:xfrm>
           <a:prstGeom prst="rect">
@@ -4037,6 +4858,66 @@
             <a:r>
               <a:rPr lang="fr-FR" dirty="0" smtClean="0"/>
               <a:t>4 sprints de ½ journée</a:t>
+            </a:r>
+            <a:endParaRPr lang="fr-FR" dirty="0"/>
+          </a:p>
+        </p:txBody>
+      </p:sp>
+      <p:sp>
+        <p:nvSpPr>
+          <p:cNvPr id="6" name="Espace réservé du numéro de diapositive 5"/>
+          <p:cNvSpPr>
+            <a:spLocks noGrp="1"/>
+          </p:cNvSpPr>
+          <p:nvPr>
+            <p:ph type="sldNum" sz="quarter" idx="12"/>
+          </p:nvPr>
+        </p:nvSpPr>
+        <p:spPr/>
+        <p:txBody>
+          <a:bodyPr/>
+          <a:lstStyle/>
+          <a:p>
+            <a:fld id="{CF4668DC-857F-487D-BFFA-8C0CA5037977}" type="slidenum">
+              <a:rPr lang="fr-BE" smtClean="0"/>
+              <a:t>11</a:t>
+            </a:fld>
+            <a:endParaRPr lang="fr-BE"/>
+          </a:p>
+        </p:txBody>
+      </p:sp>
+      <p:sp>
+        <p:nvSpPr>
+          <p:cNvPr id="7" name="ZoneTexte 6"/>
+          <p:cNvSpPr txBox="1"/>
+          <p:nvPr/>
+        </p:nvSpPr>
+        <p:spPr>
+          <a:xfrm>
+            <a:off x="971600" y="3140968"/>
+            <a:ext cx="7200800" cy="369332"/>
+          </a:xfrm>
+          <a:prstGeom prst="rect">
+            <a:avLst/>
+          </a:prstGeom>
+          <a:solidFill>
+            <a:schemeClr val="bg1"/>
+          </a:solidFill>
+        </p:spPr>
+        <p:txBody>
+          <a:bodyPr wrap="square" rtlCol="0">
+            <a:spAutoFit/>
+          </a:bodyPr>
+          <a:lstStyle/>
+          <a:p>
+            <a:pPr algn="ctr"/>
+            <a:r>
+              <a:rPr lang="fr-FR" dirty="0" err="1" smtClean="0"/>
+              <a:t>Burn</a:t>
+            </a:r>
+            <a:r>
+              <a:rPr lang="fr-FR" dirty="0" smtClean="0"/>
+              <a:t>-up chart</a:t>
             </a:r>
             <a:endParaRPr lang="fr-FR" dirty="0"/>
           </a:p>
@@ -4052,6 +4933,13 @@
   <p:clrMapOvr>
     <a:masterClrMapping/>
   </p:clrMapOvr>
+  <p:timing>
+    <p:tnLst>
+      <p:par>
+        <p:cTn id="1" dur="indefinite" restart="never" nodeType="tmRoot"/>
+      </p:par>
+    </p:tnLst>
+  </p:timing>
 </p:sld>
 </file>
 
@@ -4136,6 +5024,29 @@
           </a:p>
         </p:txBody>
       </p:sp>
+      <p:sp>
+        <p:nvSpPr>
+          <p:cNvPr id="4" name="Espace réservé du numéro de diapositive 3"/>
+          <p:cNvSpPr>
+            <a:spLocks noGrp="1"/>
+          </p:cNvSpPr>
+          <p:nvPr>
+            <p:ph type="sldNum" sz="quarter" idx="12"/>
+          </p:nvPr>
+        </p:nvSpPr>
+        <p:spPr/>
+        <p:txBody>
+          <a:bodyPr/>
+          <a:lstStyle/>
+          <a:p>
+            <a:fld id="{CF4668DC-857F-487D-BFFA-8C0CA5037977}" type="slidenum">
+              <a:rPr lang="fr-BE" smtClean="0"/>
+              <a:t>2</a:t>
+            </a:fld>
+            <a:endParaRPr lang="fr-BE"/>
+          </a:p>
+        </p:txBody>
+      </p:sp>
     </p:spTree>
     <p:extLst>
       <p:ext uri="{BB962C8B-B14F-4D97-AF65-F5344CB8AC3E}">
@@ -4146,6 +5057,13 @@
   <p:clrMapOvr>
     <a:masterClrMapping/>
   </p:clrMapOvr>
+  <p:timing>
+    <p:tnLst>
+      <p:par>
+        <p:cTn id="1" dur="indefinite" restart="never" nodeType="tmRoot"/>
+      </p:par>
+    </p:tnLst>
+  </p:timing>
 </p:sld>
 </file>
 
@@ -4302,6 +5220,29 @@
           </a:ln>
         </p:spPr>
       </p:pic>
+      <p:sp>
+        <p:nvSpPr>
+          <p:cNvPr id="6" name="Espace réservé du numéro de diapositive 5"/>
+          <p:cNvSpPr>
+            <a:spLocks noGrp="1"/>
+          </p:cNvSpPr>
+          <p:nvPr>
+            <p:ph type="sldNum" sz="quarter" idx="12"/>
+          </p:nvPr>
+        </p:nvSpPr>
+        <p:spPr/>
+        <p:txBody>
+          <a:bodyPr/>
+          <a:lstStyle/>
+          <a:p>
+            <a:fld id="{CF4668DC-857F-487D-BFFA-8C0CA5037977}" type="slidenum">
+              <a:rPr lang="fr-BE" smtClean="0"/>
+              <a:t>3</a:t>
+            </a:fld>
+            <a:endParaRPr lang="fr-BE"/>
+          </a:p>
+        </p:txBody>
+      </p:sp>
     </p:spTree>
     <p:extLst>
       <p:ext uri="{BB962C8B-B14F-4D97-AF65-F5344CB8AC3E}">
@@ -4312,6 +5253,13 @@
   <p:clrMapOvr>
     <a:masterClrMapping/>
   </p:clrMapOvr>
+  <p:timing>
+    <p:tnLst>
+      <p:par>
+        <p:cTn id="1" dur="indefinite" restart="never" nodeType="tmRoot"/>
+      </p:par>
+    </p:tnLst>
+  </p:timing>
 </p:sld>
 </file>
 
@@ -4462,6 +5410,29 @@
           </a:p>
         </p:txBody>
       </p:sp>
+      <p:sp>
+        <p:nvSpPr>
+          <p:cNvPr id="5" name="Espace réservé du numéro de diapositive 4"/>
+          <p:cNvSpPr>
+            <a:spLocks noGrp="1"/>
+          </p:cNvSpPr>
+          <p:nvPr>
+            <p:ph type="sldNum" sz="quarter" idx="12"/>
+          </p:nvPr>
+        </p:nvSpPr>
+        <p:spPr/>
+        <p:txBody>
+          <a:bodyPr/>
+          <a:lstStyle/>
+          <a:p>
+            <a:fld id="{CF4668DC-857F-487D-BFFA-8C0CA5037977}" type="slidenum">
+              <a:rPr lang="fr-BE" smtClean="0"/>
+              <a:t>4</a:t>
+            </a:fld>
+            <a:endParaRPr lang="fr-BE"/>
+          </a:p>
+        </p:txBody>
+      </p:sp>
     </p:spTree>
     <p:extLst>
       <p:ext uri="{BB962C8B-B14F-4D97-AF65-F5344CB8AC3E}">
@@ -4472,6 +5443,13 @@
   <p:clrMapOvr>
     <a:masterClrMapping/>
   </p:clrMapOvr>
+  <p:timing>
+    <p:tnLst>
+      <p:par>
+        <p:cTn id="1" dur="indefinite" restart="never" nodeType="tmRoot"/>
+      </p:par>
+    </p:tnLst>
+  </p:timing>
 </p:sld>
 </file>
 
@@ -4549,8 +5527,8 @@
         </p:nvSpPr>
         <p:spPr>
           <a:xfrm>
-            <a:off x="899592" y="2636912"/>
-            <a:ext cx="6768752" cy="2585323"/>
+            <a:off x="539552" y="2590099"/>
+            <a:ext cx="6768752" cy="3139321"/>
           </a:xfrm>
           <a:prstGeom prst="rect">
             <a:avLst/>
@@ -4579,8 +5557,13 @@
             </a:pPr>
             <a:r>
               <a:rPr lang="fr-FR" dirty="0" smtClean="0"/>
-              <a:t>Automatisation de certaines taches</a:t>
-            </a:r>
+              <a:t>Automatisation de certaines </a:t>
+            </a:r>
+            <a:r>
+              <a:rPr lang="fr-FR" dirty="0" smtClean="0"/>
+              <a:t>tâches</a:t>
+            </a:r>
+            <a:endParaRPr lang="fr-FR" dirty="0" smtClean="0"/>
           </a:p>
           <a:p>
             <a:pPr marL="285750" indent="-285750">
@@ -4589,7 +5572,11 @@
             </a:pPr>
             <a:r>
               <a:rPr lang="fr-FR" dirty="0" smtClean="0"/>
-              <a:t>Pérennisation et sécurisation des données</a:t>
+              <a:t>Pérennisation et sécurisation des </a:t>
+            </a:r>
+            <a:r>
+              <a:rPr lang="fr-FR" dirty="0" smtClean="0"/>
+              <a:t>données</a:t>
             </a:r>
           </a:p>
           <a:p>
@@ -4600,11 +5587,34 @@
             <a:endParaRPr lang="fr-FR" dirty="0"/>
           </a:p>
           <a:p>
-            <a:r>
-              <a:rPr lang="fr-FR" dirty="0" smtClean="0"/>
-              <a:t>1 release le 26/04/2018 avec les premières fonctionnalités</a:t>
-            </a:r>
-            <a:endParaRPr lang="fr-FR" dirty="0"/>
+            <a:pPr marL="285750" indent="-285750">
+              <a:buFont typeface="Arial" panose="020B0604020202020204" pitchFamily="34" charset="0"/>
+              <a:buChar char="•"/>
+            </a:pPr>
+            <a:endParaRPr lang="fr-FR" dirty="0" smtClean="0"/>
+          </a:p>
+          <a:p>
+            <a:r>
+              <a:rPr lang="fr-FR" dirty="0" smtClean="0"/>
+              <a:t>→ diminution des départs de clients</a:t>
+            </a:r>
+          </a:p>
+          <a:p>
+            <a:r>
+              <a:rPr lang="fr-FR" dirty="0" smtClean="0"/>
+              <a:t>→ augmentation du nombre de commissions de transactions</a:t>
+            </a:r>
+          </a:p>
+          <a:p>
+            <a:r>
+              <a:rPr lang="fr-FR" dirty="0"/>
+              <a:t>→ </a:t>
+            </a:r>
+            <a:r>
+              <a:rPr lang="fr-FR" dirty="0" smtClean="0"/>
+              <a:t>nouveaux clients</a:t>
+            </a:r>
+            <a:endParaRPr lang="fr-FR" dirty="0" smtClean="0"/>
           </a:p>
           <a:p>
             <a:pPr marL="285750" indent="-285750">
@@ -4614,12 +5624,25 @@
             <a:endParaRPr lang="fr-FR" dirty="0"/>
           </a:p>
           <a:p>
-            <a:endParaRPr lang="fr-FR" dirty="0"/>
-          </a:p>
-          <a:p>
-            <a:endParaRPr lang="fr-FR" dirty="0"/>
-          </a:p>
-          <a:p>
+            <a:pPr marL="285750" indent="-285750">
+              <a:buFont typeface="Arial" panose="020B0604020202020204" pitchFamily="34" charset="0"/>
+              <a:buChar char="•"/>
+            </a:pPr>
+            <a:endParaRPr lang="fr-FR" dirty="0" smtClean="0"/>
+          </a:p>
+          <a:p>
+            <a:r>
+              <a:rPr lang="fr-FR" dirty="0" smtClean="0"/>
+              <a:t>1 </a:t>
+            </a:r>
+            <a:r>
+              <a:rPr lang="fr-FR" dirty="0" smtClean="0"/>
+              <a:t>release le 26/04/2018 avec les premières </a:t>
+            </a:r>
+            <a:r>
+              <a:rPr lang="fr-FR" dirty="0" smtClean="0"/>
+              <a:t>fonctionnalités</a:t>
+            </a:r>
             <a:endParaRPr lang="fr-FR" dirty="0"/>
           </a:p>
         </p:txBody>
@@ -4658,6 +5681,29 @@
           </a:ln>
         </p:spPr>
       </p:pic>
+      <p:sp>
+        <p:nvSpPr>
+          <p:cNvPr id="6" name="Espace réservé du numéro de diapositive 5"/>
+          <p:cNvSpPr>
+            <a:spLocks noGrp="1"/>
+          </p:cNvSpPr>
+          <p:nvPr>
+            <p:ph type="sldNum" sz="quarter" idx="12"/>
+          </p:nvPr>
+        </p:nvSpPr>
+        <p:spPr/>
+        <p:txBody>
+          <a:bodyPr/>
+          <a:lstStyle/>
+          <a:p>
+            <a:fld id="{CF4668DC-857F-487D-BFFA-8C0CA5037977}" type="slidenum">
+              <a:rPr lang="fr-BE" smtClean="0"/>
+              <a:t>5</a:t>
+            </a:fld>
+            <a:endParaRPr lang="fr-BE"/>
+          </a:p>
+        </p:txBody>
+      </p:sp>
     </p:spTree>
     <p:extLst>
       <p:ext uri="{BB962C8B-B14F-4D97-AF65-F5344CB8AC3E}">
@@ -4668,6 +5714,13 @@
   <p:clrMapOvr>
     <a:masterClrMapping/>
   </p:clrMapOvr>
+  <p:timing>
+    <p:tnLst>
+      <p:par>
+        <p:cTn id="1" dur="indefinite" restart="never" nodeType="tmRoot"/>
+      </p:par>
+    </p:tnLst>
+  </p:timing>
 </p:sld>
 </file>
 
@@ -4721,76 +5774,185 @@
             <p:ph idx="1"/>
           </p:nvPr>
         </p:nvSpPr>
+        <p:spPr/>
+        <p:txBody>
+          <a:bodyPr/>
+          <a:lstStyle/>
+          <a:p>
+            <a:pPr marL="0" indent="0">
+              <a:buNone/>
+            </a:pPr>
+            <a:r>
+              <a:rPr lang="fr-FR" dirty="0" smtClean="0"/>
+              <a:t>4. Equipe</a:t>
+            </a:r>
+            <a:endParaRPr lang="fr-FR" dirty="0"/>
+          </a:p>
+        </p:txBody>
+      </p:sp>
+      <p:sp>
+        <p:nvSpPr>
+          <p:cNvPr id="4" name="ZoneTexte 3"/>
+          <p:cNvSpPr txBox="1"/>
+          <p:nvPr/>
+        </p:nvSpPr>
         <p:spPr>
           <a:xfrm>
-            <a:off x="457200" y="1196752"/>
-            <a:ext cx="8229600" cy="4525963"/>
-          </a:xfrm>
-        </p:spPr>
-        <p:txBody>
-          <a:bodyPr/>
-          <a:lstStyle/>
-          <a:p>
-            <a:pPr marL="0" indent="0">
-              <a:buNone/>
-            </a:pPr>
-            <a:r>
-              <a:rPr lang="fr-FR" dirty="0" smtClean="0"/>
-              <a:t>3. Lean </a:t>
-            </a:r>
-            <a:r>
-              <a:rPr lang="fr-FR" dirty="0" err="1" smtClean="0"/>
-              <a:t>canvas</a:t>
-            </a:r>
-            <a:endParaRPr lang="fr-FR" dirty="0"/>
-          </a:p>
-        </p:txBody>
-      </p:sp>
-      <p:pic>
-        <p:nvPicPr>
-          <p:cNvPr id="6" name="Image 5"/>
-          <p:cNvPicPr>
-            <a:picLocks noChangeAspect="1"/>
-          </p:cNvPicPr>
-          <p:nvPr/>
-        </p:nvPicPr>
-        <p:blipFill>
-          <a:blip r:embed="rId2">
-            <a:extLst>
-              <a:ext uri="{28A0092B-C50C-407E-A947-70E740481C1C}">
-                <a14:useLocalDpi xmlns:a14="http://schemas.microsoft.com/office/drawing/2010/main" val="0"/>
-              </a:ext>
-            </a:extLst>
-          </a:blip>
-          <a:stretch>
-            <a:fillRect/>
-          </a:stretch>
-        </p:blipFill>
-        <p:spPr>
-          <a:xfrm>
-            <a:off x="1115616" y="1772816"/>
-            <a:ext cx="6768752" cy="4713710"/>
+            <a:off x="899592" y="2636912"/>
+            <a:ext cx="8244408" cy="3416320"/>
           </a:xfrm>
           <a:prstGeom prst="rect">
             <a:avLst/>
           </a:prstGeom>
-          <a:ln>
-            <a:solidFill>
-              <a:schemeClr val="tx1"/>
-            </a:solidFill>
-          </a:ln>
+          <a:noFill/>
         </p:spPr>
-      </p:pic>
+        <p:txBody>
+          <a:bodyPr wrap="square" rtlCol="0">
+            <a:spAutoFit/>
+          </a:bodyPr>
+          <a:lstStyle/>
+          <a:p>
+            <a:pPr marL="285750" indent="-285750">
+              <a:buFont typeface="Arial" panose="020B0604020202020204" pitchFamily="34" charset="0"/>
+              <a:buChar char="•"/>
+            </a:pPr>
+            <a:r>
+              <a:rPr lang="fr-FR" dirty="0" smtClean="0"/>
+              <a:t>Salah Eddine BENAZOUZ – Leader technique</a:t>
+            </a:r>
+          </a:p>
+          <a:p>
+            <a:pPr marL="742950" lvl="1" indent="-285750">
+              <a:buFont typeface="Arial" panose="020B0604020202020204" pitchFamily="34" charset="0"/>
+              <a:buChar char="•"/>
+            </a:pPr>
+            <a:r>
+              <a:rPr lang="fr-FR" dirty="0" smtClean="0"/>
+              <a:t>Ingénieur en électrotechnique</a:t>
+            </a:r>
+          </a:p>
+          <a:p>
+            <a:pPr marL="742950" lvl="1" indent="-285750">
+              <a:buFont typeface="Arial" panose="020B0604020202020204" pitchFamily="34" charset="0"/>
+              <a:buChar char="•"/>
+            </a:pPr>
+            <a:r>
+              <a:rPr lang="fr-FR" dirty="0" smtClean="0"/>
+              <a:t>Formation </a:t>
+            </a:r>
+            <a:r>
+              <a:rPr lang="fr-FR" dirty="0"/>
+              <a:t>de concepteur-développeur Java-JEE (GT’M </a:t>
+            </a:r>
+            <a:r>
+              <a:rPr lang="fr-FR" dirty="0" smtClean="0"/>
+              <a:t>Ingénierie)</a:t>
+            </a:r>
+          </a:p>
+          <a:p>
+            <a:pPr marL="285750" indent="-285750">
+              <a:buFont typeface="Arial" panose="020B0604020202020204" pitchFamily="34" charset="0"/>
+              <a:buChar char="•"/>
+            </a:pPr>
+            <a:endParaRPr lang="fr-FR" dirty="0"/>
+          </a:p>
+          <a:p>
+            <a:pPr marL="285750" indent="-285750">
+              <a:buFont typeface="Arial" panose="020B0604020202020204" pitchFamily="34" charset="0"/>
+              <a:buChar char="•"/>
+            </a:pPr>
+            <a:endParaRPr lang="fr-FR" dirty="0" smtClean="0"/>
+          </a:p>
+          <a:p>
+            <a:pPr marL="285750" indent="-285750">
+              <a:buFont typeface="Arial" panose="020B0604020202020204" pitchFamily="34" charset="0"/>
+              <a:buChar char="•"/>
+            </a:pPr>
+            <a:endParaRPr lang="fr-FR" dirty="0"/>
+          </a:p>
+          <a:p>
+            <a:pPr marL="285750" indent="-285750">
+              <a:buFont typeface="Arial" panose="020B0604020202020204" pitchFamily="34" charset="0"/>
+              <a:buChar char="•"/>
+            </a:pPr>
+            <a:r>
+              <a:rPr lang="fr-FR" dirty="0" smtClean="0"/>
+              <a:t>Frédéric BATAULT – SCRUM Master</a:t>
+            </a:r>
+            <a:endParaRPr lang="fr-FR" dirty="0"/>
+          </a:p>
+          <a:p>
+            <a:pPr marL="742950" lvl="1" indent="-285750">
+              <a:buFont typeface="Arial" panose="020B0604020202020204" pitchFamily="34" charset="0"/>
+              <a:buChar char="•"/>
+            </a:pPr>
+            <a:r>
+              <a:rPr lang="fr-FR" dirty="0" smtClean="0"/>
+              <a:t>Docteur en chimie</a:t>
+            </a:r>
+          </a:p>
+          <a:p>
+            <a:pPr marL="742950" lvl="1" indent="-285750">
+              <a:buFont typeface="Arial" panose="020B0604020202020204" pitchFamily="34" charset="0"/>
+              <a:buChar char="•"/>
+            </a:pPr>
+            <a:r>
+              <a:rPr lang="fr-FR" dirty="0" smtClean="0"/>
+              <a:t>Formation de concepteur-développeur Java-JEE (GT’M Ingénierie)</a:t>
+            </a:r>
+            <a:endParaRPr lang="fr-FR" dirty="0"/>
+          </a:p>
+          <a:p>
+            <a:endParaRPr lang="fr-FR" dirty="0"/>
+          </a:p>
+          <a:p>
+            <a:endParaRPr lang="fr-FR" dirty="0"/>
+          </a:p>
+          <a:p>
+            <a:endParaRPr lang="fr-FR" dirty="0"/>
+          </a:p>
+        </p:txBody>
+      </p:sp>
+      <p:sp>
+        <p:nvSpPr>
+          <p:cNvPr id="5" name="Espace réservé du numéro de diapositive 4"/>
+          <p:cNvSpPr>
+            <a:spLocks noGrp="1"/>
+          </p:cNvSpPr>
+          <p:nvPr>
+            <p:ph type="sldNum" sz="quarter" idx="12"/>
+          </p:nvPr>
+        </p:nvSpPr>
+        <p:spPr/>
+        <p:txBody>
+          <a:bodyPr/>
+          <a:lstStyle/>
+          <a:p>
+            <a:fld id="{CF4668DC-857F-487D-BFFA-8C0CA5037977}" type="slidenum">
+              <a:rPr lang="fr-BE" smtClean="0"/>
+              <a:t>6</a:t>
+            </a:fld>
+            <a:endParaRPr lang="fr-BE"/>
+          </a:p>
+        </p:txBody>
+      </p:sp>
     </p:spTree>
     <p:extLst>
       <p:ext uri="{BB962C8B-B14F-4D97-AF65-F5344CB8AC3E}">
-        <p14:creationId xmlns:p14="http://schemas.microsoft.com/office/powerpoint/2010/main" val="48414355"/>
+        <p14:creationId xmlns:p14="http://schemas.microsoft.com/office/powerpoint/2010/main" val="1248137095"/>
       </p:ext>
     </p:extLst>
   </p:cSld>
   <p:clrMapOvr>
     <a:masterClrMapping/>
   </p:clrMapOvr>
+  <p:timing>
+    <p:tnLst>
+      <p:par>
+        <p:cTn id="1" dur="indefinite" restart="never" nodeType="tmRoot"/>
+      </p:par>
+    </p:tnLst>
+  </p:timing>
 </p:sld>
 </file>
 
@@ -4828,208 +5990,6 @@
           <a:p>
             <a:r>
               <a:rPr lang="fr-FR" dirty="0" smtClean="0"/>
-              <a:t>I. Contexte</a:t>
-            </a:r>
-            <a:endParaRPr lang="fr-FR" dirty="0"/>
-          </a:p>
-        </p:txBody>
-      </p:sp>
-      <p:sp>
-        <p:nvSpPr>
-          <p:cNvPr id="3" name="Espace réservé du contenu 2"/>
-          <p:cNvSpPr>
-            <a:spLocks noGrp="1"/>
-          </p:cNvSpPr>
-          <p:nvPr>
-            <p:ph idx="1"/>
-          </p:nvPr>
-        </p:nvSpPr>
-        <p:spPr/>
-        <p:txBody>
-          <a:bodyPr/>
-          <a:lstStyle/>
-          <a:p>
-            <a:pPr marL="0" indent="0">
-              <a:buNone/>
-            </a:pPr>
-            <a:r>
-              <a:rPr lang="fr-FR" dirty="0" smtClean="0"/>
-              <a:t>4. Equipe</a:t>
-            </a:r>
-            <a:endParaRPr lang="fr-FR" dirty="0"/>
-          </a:p>
-        </p:txBody>
-      </p:sp>
-      <p:sp>
-        <p:nvSpPr>
-          <p:cNvPr id="4" name="ZoneTexte 3"/>
-          <p:cNvSpPr txBox="1"/>
-          <p:nvPr/>
-        </p:nvSpPr>
-        <p:spPr>
-          <a:xfrm>
-            <a:off x="899592" y="2636912"/>
-            <a:ext cx="8244408" cy="3416320"/>
-          </a:xfrm>
-          <a:prstGeom prst="rect">
-            <a:avLst/>
-          </a:prstGeom>
-          <a:noFill/>
-        </p:spPr>
-        <p:txBody>
-          <a:bodyPr wrap="square" rtlCol="0">
-            <a:spAutoFit/>
-          </a:bodyPr>
-          <a:lstStyle/>
-          <a:p>
-            <a:pPr marL="285750" indent="-285750">
-              <a:buFont typeface="Arial" panose="020B0604020202020204" pitchFamily="34" charset="0"/>
-              <a:buChar char="•"/>
-            </a:pPr>
-            <a:r>
-              <a:rPr lang="fr-FR" dirty="0" smtClean="0"/>
-              <a:t>Salah Eddine BENAZOUZ – Leader technique</a:t>
-            </a:r>
-          </a:p>
-          <a:p>
-            <a:pPr marL="742950" lvl="1" indent="-285750">
-              <a:buFont typeface="Arial" panose="020B0604020202020204" pitchFamily="34" charset="0"/>
-              <a:buChar char="•"/>
-            </a:pPr>
-            <a:r>
-              <a:rPr lang="fr-FR" dirty="0" smtClean="0"/>
-              <a:t>Ingénieur en électrotechnique</a:t>
-            </a:r>
-          </a:p>
-          <a:p>
-            <a:pPr marL="742950" lvl="1" indent="-285750">
-              <a:buFont typeface="Arial" panose="020B0604020202020204" pitchFamily="34" charset="0"/>
-              <a:buChar char="•"/>
-            </a:pPr>
-            <a:r>
-              <a:rPr lang="fr-FR" dirty="0" smtClean="0"/>
-              <a:t>Formation </a:t>
-            </a:r>
-            <a:r>
-              <a:rPr lang="fr-FR" dirty="0"/>
-              <a:t>de concepteur-développeur Java-JEE (GT’M </a:t>
-            </a:r>
-            <a:r>
-              <a:rPr lang="fr-FR" dirty="0" smtClean="0"/>
-              <a:t>Ingénierie)</a:t>
-            </a:r>
-          </a:p>
-          <a:p>
-            <a:pPr marL="285750" indent="-285750">
-              <a:buFont typeface="Arial" panose="020B0604020202020204" pitchFamily="34" charset="0"/>
-              <a:buChar char="•"/>
-            </a:pPr>
-            <a:endParaRPr lang="fr-FR" dirty="0"/>
-          </a:p>
-          <a:p>
-            <a:pPr marL="285750" indent="-285750">
-              <a:buFont typeface="Arial" panose="020B0604020202020204" pitchFamily="34" charset="0"/>
-              <a:buChar char="•"/>
-            </a:pPr>
-            <a:endParaRPr lang="fr-FR" dirty="0" smtClean="0"/>
-          </a:p>
-          <a:p>
-            <a:pPr marL="285750" indent="-285750">
-              <a:buFont typeface="Arial" panose="020B0604020202020204" pitchFamily="34" charset="0"/>
-              <a:buChar char="•"/>
-            </a:pPr>
-            <a:endParaRPr lang="fr-FR" dirty="0"/>
-          </a:p>
-          <a:p>
-            <a:pPr marL="285750" indent="-285750">
-              <a:buFont typeface="Arial" panose="020B0604020202020204" pitchFamily="34" charset="0"/>
-              <a:buChar char="•"/>
-            </a:pPr>
-            <a:r>
-              <a:rPr lang="fr-FR" dirty="0" smtClean="0"/>
-              <a:t>Frédéric BATAULT – SCRUM Master</a:t>
-            </a:r>
-            <a:endParaRPr lang="fr-FR" dirty="0"/>
-          </a:p>
-          <a:p>
-            <a:pPr marL="742950" lvl="1" indent="-285750">
-              <a:buFont typeface="Arial" panose="020B0604020202020204" pitchFamily="34" charset="0"/>
-              <a:buChar char="•"/>
-            </a:pPr>
-            <a:r>
-              <a:rPr lang="fr-FR" dirty="0" smtClean="0"/>
-              <a:t>Docteur en chimie</a:t>
-            </a:r>
-          </a:p>
-          <a:p>
-            <a:pPr marL="742950" lvl="1" indent="-285750">
-              <a:buFont typeface="Arial" panose="020B0604020202020204" pitchFamily="34" charset="0"/>
-              <a:buChar char="•"/>
-            </a:pPr>
-            <a:r>
-              <a:rPr lang="fr-FR" dirty="0" smtClean="0"/>
-              <a:t>Formation de concepteur-développeur Java-JEE (GT’M Ingénierie)</a:t>
-            </a:r>
-            <a:endParaRPr lang="fr-FR" dirty="0"/>
-          </a:p>
-          <a:p>
-            <a:endParaRPr lang="fr-FR" dirty="0"/>
-          </a:p>
-          <a:p>
-            <a:endParaRPr lang="fr-FR" dirty="0"/>
-          </a:p>
-          <a:p>
-            <a:endParaRPr lang="fr-FR" dirty="0"/>
-          </a:p>
-        </p:txBody>
-      </p:sp>
-    </p:spTree>
-    <p:extLst>
-      <p:ext uri="{BB962C8B-B14F-4D97-AF65-F5344CB8AC3E}">
-        <p14:creationId xmlns:p14="http://schemas.microsoft.com/office/powerpoint/2010/main" val="1248137095"/>
-      </p:ext>
-    </p:extLst>
-  </p:cSld>
-  <p:clrMapOvr>
-    <a:masterClrMapping/>
-  </p:clrMapOvr>
-</p:sld>
-</file>
-
-<file path=ppt/slides/slide8.xml><?xml version="1.0" encoding="utf-8"?>
-<p:sld xmlns:a="http://schemas.openxmlformats.org/drawingml/2006/main" xmlns:r="http://schemas.openxmlformats.org/officeDocument/2006/relationships" xmlns:p="http://schemas.openxmlformats.org/presentationml/2006/main">
-  <p:cSld>
-    <p:spTree>
-      <p:nvGrpSpPr>
-        <p:cNvPr id="1" name=""/>
-        <p:cNvGrpSpPr/>
-        <p:nvPr/>
-      </p:nvGrpSpPr>
-      <p:grpSpPr>
-        <a:xfrm>
-          <a:off x="0" y="0"/>
-          <a:ext cx="0" cy="0"/>
-          <a:chOff x="0" y="0"/>
-          <a:chExt cx="0" cy="0"/>
-        </a:xfrm>
-      </p:grpSpPr>
-      <p:sp>
-        <p:nvSpPr>
-          <p:cNvPr id="2" name="Titre 1"/>
-          <p:cNvSpPr>
-            <a:spLocks noGrp="1"/>
-          </p:cNvSpPr>
-          <p:nvPr>
-            <p:ph type="title"/>
-          </p:nvPr>
-        </p:nvSpPr>
-        <p:spPr/>
-        <p:txBody>
-          <a:bodyPr/>
-          <a:lstStyle/>
-          <a:p>
-            <a:r>
-              <a:rPr lang="fr-FR" dirty="0" smtClean="0"/>
               <a:t>II. Conception du projet</a:t>
             </a:r>
             <a:endParaRPr lang="fr-FR" dirty="0"/>
@@ -5116,6 +6076,29 @@
           </a:p>
         </p:txBody>
       </p:sp>
+      <p:sp>
+        <p:nvSpPr>
+          <p:cNvPr id="5" name="Espace réservé du numéro de diapositive 4"/>
+          <p:cNvSpPr>
+            <a:spLocks noGrp="1"/>
+          </p:cNvSpPr>
+          <p:nvPr>
+            <p:ph type="sldNum" sz="quarter" idx="12"/>
+          </p:nvPr>
+        </p:nvSpPr>
+        <p:spPr/>
+        <p:txBody>
+          <a:bodyPr/>
+          <a:lstStyle/>
+          <a:p>
+            <a:fld id="{CF4668DC-857F-487D-BFFA-8C0CA5037977}" type="slidenum">
+              <a:rPr lang="fr-BE" smtClean="0"/>
+              <a:t>7</a:t>
+            </a:fld>
+            <a:endParaRPr lang="fr-BE"/>
+          </a:p>
+        </p:txBody>
+      </p:sp>
     </p:spTree>
     <p:extLst>
       <p:ext uri="{BB962C8B-B14F-4D97-AF65-F5344CB8AC3E}">
@@ -5126,10 +6109,17 @@
   <p:clrMapOvr>
     <a:masterClrMapping/>
   </p:clrMapOvr>
+  <p:timing>
+    <p:tnLst>
+      <p:par>
+        <p:cTn id="1" dur="indefinite" restart="never" nodeType="tmRoot"/>
+      </p:par>
+    </p:tnLst>
+  </p:timing>
 </p:sld>
 </file>
 
-<file path=ppt/slides/slide9.xml><?xml version="1.0" encoding="utf-8"?>
+<file path=ppt/slides/slide8.xml><?xml version="1.0" encoding="utf-8"?>
 <p:sld xmlns:a="http://schemas.openxmlformats.org/drawingml/2006/main" xmlns:r="http://schemas.openxmlformats.org/officeDocument/2006/relationships" xmlns:p="http://schemas.openxmlformats.org/presentationml/2006/main">
   <p:cSld>
     <p:spTree>
@@ -5253,6 +6243,29 @@
           </a:p>
         </p:txBody>
       </p:sp>
+      <p:sp>
+        <p:nvSpPr>
+          <p:cNvPr id="4" name="Espace réservé du numéro de diapositive 3"/>
+          <p:cNvSpPr>
+            <a:spLocks noGrp="1"/>
+          </p:cNvSpPr>
+          <p:nvPr>
+            <p:ph type="sldNum" sz="quarter" idx="12"/>
+          </p:nvPr>
+        </p:nvSpPr>
+        <p:spPr/>
+        <p:txBody>
+          <a:bodyPr/>
+          <a:lstStyle/>
+          <a:p>
+            <a:fld id="{CF4668DC-857F-487D-BFFA-8C0CA5037977}" type="slidenum">
+              <a:rPr lang="fr-BE" smtClean="0"/>
+              <a:t>8</a:t>
+            </a:fld>
+            <a:endParaRPr lang="fr-BE"/>
+          </a:p>
+        </p:txBody>
+      </p:sp>
     </p:spTree>
     <p:extLst>
       <p:ext uri="{BB962C8B-B14F-4D97-AF65-F5344CB8AC3E}">
@@ -5263,6 +6276,191 @@
   <p:clrMapOvr>
     <a:masterClrMapping/>
   </p:clrMapOvr>
+  <p:timing>
+    <p:tnLst>
+      <p:par>
+        <p:cTn id="1" dur="indefinite" restart="never" nodeType="tmRoot"/>
+      </p:par>
+    </p:tnLst>
+  </p:timing>
+</p:sld>
+</file>
+
+<file path=ppt/slides/slide9.xml><?xml version="1.0" encoding="utf-8"?>
+<p:sld xmlns:a="http://schemas.openxmlformats.org/drawingml/2006/main" xmlns:r="http://schemas.openxmlformats.org/officeDocument/2006/relationships" xmlns:p="http://schemas.openxmlformats.org/presentationml/2006/main">
+  <p:cSld>
+    <p:spTree>
+      <p:nvGrpSpPr>
+        <p:cNvPr id="1" name=""/>
+        <p:cNvGrpSpPr/>
+        <p:nvPr/>
+      </p:nvGrpSpPr>
+      <p:grpSpPr>
+        <a:xfrm>
+          <a:off x="0" y="0"/>
+          <a:ext cx="0" cy="0"/>
+          <a:chOff x="0" y="0"/>
+          <a:chExt cx="0" cy="0"/>
+        </a:xfrm>
+      </p:grpSpPr>
+      <p:sp>
+        <p:nvSpPr>
+          <p:cNvPr id="2" name="Titre 1"/>
+          <p:cNvSpPr>
+            <a:spLocks noGrp="1"/>
+          </p:cNvSpPr>
+          <p:nvPr>
+            <p:ph type="title"/>
+          </p:nvPr>
+        </p:nvSpPr>
+        <p:spPr/>
+        <p:txBody>
+          <a:bodyPr/>
+          <a:lstStyle/>
+          <a:p>
+            <a:r>
+              <a:rPr lang="fr-FR" dirty="0" smtClean="0"/>
+              <a:t>II. Conception du projet</a:t>
+            </a:r>
+            <a:endParaRPr lang="fr-FR" dirty="0"/>
+          </a:p>
+        </p:txBody>
+      </p:sp>
+      <p:sp>
+        <p:nvSpPr>
+          <p:cNvPr id="3" name="Espace réservé du contenu 2"/>
+          <p:cNvSpPr>
+            <a:spLocks noGrp="1"/>
+          </p:cNvSpPr>
+          <p:nvPr>
+            <p:ph idx="1"/>
+          </p:nvPr>
+        </p:nvSpPr>
+        <p:spPr/>
+        <p:txBody>
+          <a:bodyPr/>
+          <a:lstStyle/>
+          <a:p>
+            <a:pPr marL="0" indent="0">
+              <a:buNone/>
+            </a:pPr>
+            <a:r>
+              <a:rPr lang="fr-FR" dirty="0" smtClean="0"/>
+              <a:t>3. Road </a:t>
+            </a:r>
+            <a:r>
+              <a:rPr lang="fr-FR" dirty="0" err="1" smtClean="0"/>
+              <a:t>Map</a:t>
+            </a:r>
+            <a:r>
+              <a:rPr lang="fr-FR" dirty="0" smtClean="0"/>
+              <a:t> du produit</a:t>
+            </a:r>
+            <a:endParaRPr lang="fr-FR" dirty="0"/>
+          </a:p>
+        </p:txBody>
+      </p:sp>
+      <p:sp>
+        <p:nvSpPr>
+          <p:cNvPr id="5" name="ZoneTexte 4"/>
+          <p:cNvSpPr txBox="1"/>
+          <p:nvPr/>
+        </p:nvSpPr>
+        <p:spPr>
+          <a:xfrm>
+            <a:off x="1547664" y="2348880"/>
+            <a:ext cx="4320480" cy="369332"/>
+          </a:xfrm>
+          <a:prstGeom prst="rect">
+            <a:avLst/>
+          </a:prstGeom>
+          <a:noFill/>
+        </p:spPr>
+        <p:txBody>
+          <a:bodyPr wrap="square" rtlCol="0">
+            <a:spAutoFit/>
+          </a:bodyPr>
+          <a:lstStyle/>
+          <a:p>
+            <a:r>
+              <a:rPr lang="fr-FR" dirty="0" smtClean="0"/>
+              <a:t>1 release pour </a:t>
+            </a:r>
+            <a:r>
+              <a:rPr lang="fr-FR" dirty="0" err="1" smtClean="0"/>
+              <a:t>Proxibanque</a:t>
+            </a:r>
+            <a:r>
+              <a:rPr lang="fr-FR" dirty="0" smtClean="0"/>
+              <a:t> V3</a:t>
+            </a:r>
+            <a:endParaRPr lang="fr-FR" dirty="0"/>
+          </a:p>
+        </p:txBody>
+      </p:sp>
+      <p:sp>
+        <p:nvSpPr>
+          <p:cNvPr id="6" name="Espace réservé du numéro de diapositive 5"/>
+          <p:cNvSpPr>
+            <a:spLocks noGrp="1"/>
+          </p:cNvSpPr>
+          <p:nvPr>
+            <p:ph type="sldNum" sz="quarter" idx="12"/>
+          </p:nvPr>
+        </p:nvSpPr>
+        <p:spPr/>
+        <p:txBody>
+          <a:bodyPr/>
+          <a:lstStyle/>
+          <a:p>
+            <a:fld id="{CF4668DC-857F-487D-BFFA-8C0CA5037977}" type="slidenum">
+              <a:rPr lang="fr-BE" smtClean="0"/>
+              <a:t>9</a:t>
+            </a:fld>
+            <a:endParaRPr lang="fr-BE"/>
+          </a:p>
+        </p:txBody>
+      </p:sp>
+      <p:pic>
+        <p:nvPicPr>
+          <p:cNvPr id="7" name="Image 6"/>
+          <p:cNvPicPr>
+            <a:picLocks noChangeAspect="1"/>
+          </p:cNvPicPr>
+          <p:nvPr/>
+        </p:nvPicPr>
+        <p:blipFill rotWithShape="1">
+          <a:blip r:embed="rId2"/>
+          <a:srcRect l="5118" t="21492" r="78663" b="49785"/>
+          <a:stretch/>
+        </p:blipFill>
+        <p:spPr>
+          <a:xfrm>
+            <a:off x="1619672" y="2780928"/>
+            <a:ext cx="3672408" cy="3658230"/>
+          </a:xfrm>
+          <a:prstGeom prst="rect">
+            <a:avLst/>
+          </a:prstGeom>
+        </p:spPr>
+      </p:pic>
+    </p:spTree>
+    <p:extLst>
+      <p:ext uri="{BB962C8B-B14F-4D97-AF65-F5344CB8AC3E}">
+        <p14:creationId xmlns:p14="http://schemas.microsoft.com/office/powerpoint/2010/main" val="3193640519"/>
+      </p:ext>
+    </p:extLst>
+  </p:cSld>
+  <p:clrMapOvr>
+    <a:masterClrMapping/>
+  </p:clrMapOvr>
+  <p:timing>
+    <p:tnLst>
+      <p:par>
+        <p:cTn id="1" dur="indefinite" restart="never" nodeType="tmRoot"/>
+      </p:par>
+    </p:tnLst>
+  </p:timing>
 </p:sld>
 </file>
 
@@ -5547,4 +6745,265 @@
   <a:objectDefaults/>
   <a:extraClrSchemeLst/>
 </a:theme>
+</file>
+
+<file path=ppt/theme/theme2.xml><?xml version="1.0" encoding="utf-8"?>
+<a:theme xmlns:a="http://schemas.openxmlformats.org/drawingml/2006/main" name="Thème Office">
+  <a:themeElements>
+    <a:clrScheme name="Office">
+      <a:dk1>
+        <a:sysClr val="windowText" lastClr="000000"/>
+      </a:dk1>
+      <a:lt1>
+        <a:sysClr val="window" lastClr="FFFFFF"/>
+      </a:lt1>
+      <a:dk2>
+        <a:srgbClr val="44546A"/>
+      </a:dk2>
+      <a:lt2>
+        <a:srgbClr val="E7E6E6"/>
+      </a:lt2>
+      <a:accent1>
+        <a:srgbClr val="5B9BD5"/>
+      </a:accent1>
+      <a:accent2>
+        <a:srgbClr val="ED7D31"/>
+      </a:accent2>
+      <a:accent3>
+        <a:srgbClr val="A5A5A5"/>
+      </a:accent3>
+      <a:accent4>
+        <a:srgbClr val="FFC000"/>
+      </a:accent4>
+      <a:accent5>
+        <a:srgbClr val="4472C4"/>
+      </a:accent5>
+      <a:accent6>
+        <a:srgbClr val="70AD47"/>
+      </a:accent6>
+      <a:hlink>
+        <a:srgbClr val="0563C1"/>
+      </a:hlink>
+      <a:folHlink>
+        <a:srgbClr val="954F72"/>
+      </a:folHlink>
+    </a:clrScheme>
+    <a:fontScheme name="Office">
+      <a:majorFont>
+        <a:latin typeface="Calibri Light" panose="020F0302020204030204"/>
+        <a:ea typeface=""/>
+        <a:cs typeface=""/>
+        <a:font script="Jpan" typeface="ＭＳ Ｐゴシック"/>
+        <a:font script="Hang" typeface="맑은 고딕"/>
+        <a:font script="Hans" typeface="宋体"/>
+        <a:font script="Hant" typeface="新細明體"/>
+        <a:font script="Arab" typeface="Times New Roman"/>
+        <a:font script="Hebr" typeface="Times New Roman"/>
+        <a:font script="Thai" typeface="Angsana New"/>
+        <a:font script="Ethi" typeface="Nyala"/>
+        <a:font script="Beng" typeface="Vrinda"/>
+        <a:font script="Gujr" typeface="Shruti"/>
+        <a:font script="Khmr" typeface="MoolBoran"/>
+        <a:font script="Knda" typeface="Tunga"/>
+        <a:font script="Guru" typeface="Raavi"/>
+        <a:font script="Cans" typeface="Euphemia"/>
+        <a:font script="Cher" typeface="Plantagenet Cherokee"/>
+        <a:font script="Yiii" typeface="Microsoft Yi Baiti"/>
+        <a:font script="Tibt" typeface="Microsoft Himalaya"/>
+        <a:font script="Thaa" typeface="MV Boli"/>
+        <a:font script="Deva" typeface="Mangal"/>
+        <a:font script="Telu" typeface="Gautami"/>
+        <a:font script="Taml" typeface="Latha"/>
+        <a:font script="Syrc" typeface="Estrangelo Edessa"/>
+        <a:font script="Orya" typeface="Kalinga"/>
+        <a:font script="Mlym" typeface="Kartika"/>
+        <a:font script="Laoo" typeface="DokChampa"/>
+        <a:font script="Sinh" typeface="Iskoola Pota"/>
+        <a:font script="Mong" typeface="Mongolian Baiti"/>
+        <a:font script="Viet" typeface="Times New Roman"/>
+        <a:font script="Uigh" typeface="Microsoft Uighur"/>
+        <a:font script="Geor" typeface="Sylfaen"/>
+      </a:majorFont>
+      <a:minorFont>
+        <a:latin typeface="Calibri" panose="020F0502020204030204"/>
+        <a:ea typeface=""/>
+        <a:cs typeface=""/>
+        <a:font script="Jpan" typeface="ＭＳ Ｐゴシック"/>
+        <a:font script="Hang" typeface="맑은 고딕"/>
+        <a:font script="Hans" typeface="宋体"/>
+        <a:font script="Hant" typeface="新細明體"/>
+        <a:font script="Arab" typeface="Arial"/>
+        <a:font script="Hebr" typeface="Arial"/>
+        <a:font script="Thai" typeface="Cordia New"/>
+        <a:font script="Ethi" typeface="Nyala"/>
+        <a:font script="Beng" typeface="Vrinda"/>
+        <a:font script="Gujr" typeface="Shruti"/>
+        <a:font script="Khmr" typeface="DaunPenh"/>
+        <a:font script="Knda" typeface="Tunga"/>
+        <a:font script="Guru" typeface="Raavi"/>
+        <a:font script="Cans" typeface="Euphemia"/>
+        <a:font script="Cher" typeface="Plantagenet Cherokee"/>
+        <a:font script="Yiii" typeface="Microsoft Yi Baiti"/>
+        <a:font script="Tibt" typeface="Microsoft Himalaya"/>
+        <a:font script="Thaa" typeface="MV Boli"/>
+        <a:font script="Deva" typeface="Mangal"/>
+        <a:font script="Telu" typeface="Gautami"/>
+        <a:font script="Taml" typeface="Latha"/>
+        <a:font script="Syrc" typeface="Estrangelo Edessa"/>
+        <a:font script="Orya" typeface="Kalinga"/>
+        <a:font script="Mlym" typeface="Kartika"/>
+        <a:font script="Laoo" typeface="DokChampa"/>
+        <a:font script="Sinh" typeface="Iskoola Pota"/>
+        <a:font script="Mong" typeface="Mongolian Baiti"/>
+        <a:font script="Viet" typeface="Arial"/>
+        <a:font script="Uigh" typeface="Microsoft Uighur"/>
+        <a:font script="Geor" typeface="Sylfaen"/>
+      </a:minorFont>
+    </a:fontScheme>
+    <a:fmtScheme name="Office">
+      <a:fillStyleLst>
+        <a:solidFill>
+          <a:schemeClr val="phClr"/>
+        </a:solidFill>
+        <a:gradFill rotWithShape="1">
+          <a:gsLst>
+            <a:gs pos="0">
+              <a:schemeClr val="phClr">
+                <a:lumMod val="110000"/>
+                <a:satMod val="105000"/>
+                <a:tint val="67000"/>
+              </a:schemeClr>
+            </a:gs>
+            <a:gs pos="50000">
+              <a:schemeClr val="phClr">
+                <a:lumMod val="105000"/>
+                <a:satMod val="103000"/>
+                <a:tint val="73000"/>
+              </a:schemeClr>
+            </a:gs>
+            <a:gs pos="100000">
+              <a:schemeClr val="phClr">
+                <a:lumMod val="105000"/>
+                <a:satMod val="109000"/>
+                <a:tint val="81000"/>
+              </a:schemeClr>
+            </a:gs>
+          </a:gsLst>
+          <a:lin ang="5400000" scaled="0"/>
+        </a:gradFill>
+        <a:gradFill rotWithShape="1">
+          <a:gsLst>
+            <a:gs pos="0">
+              <a:schemeClr val="phClr">
+                <a:satMod val="103000"/>
+                <a:lumMod val="102000"/>
+                <a:tint val="94000"/>
+              </a:schemeClr>
+            </a:gs>
+            <a:gs pos="50000">
+              <a:schemeClr val="phClr">
+                <a:satMod val="110000"/>
+                <a:lumMod val="100000"/>
+                <a:shade val="100000"/>
+              </a:schemeClr>
+            </a:gs>
+            <a:gs pos="100000">
+              <a:schemeClr val="phClr">
+                <a:lumMod val="99000"/>
+                <a:satMod val="120000"/>
+                <a:shade val="78000"/>
+              </a:schemeClr>
+            </a:gs>
+          </a:gsLst>
+          <a:lin ang="5400000" scaled="0"/>
+        </a:gradFill>
+      </a:fillStyleLst>
+      <a:lnStyleLst>
+        <a:ln w="6350" cap="flat" cmpd="sng" algn="ctr">
+          <a:solidFill>
+            <a:schemeClr val="phClr"/>
+          </a:solidFill>
+          <a:prstDash val="solid"/>
+          <a:miter lim="800000"/>
+        </a:ln>
+        <a:ln w="12700" cap="flat" cmpd="sng" algn="ctr">
+          <a:solidFill>
+            <a:schemeClr val="phClr"/>
+          </a:solidFill>
+          <a:prstDash val="solid"/>
+          <a:miter lim="800000"/>
+        </a:ln>
+        <a:ln w="19050" cap="flat" cmpd="sng" algn="ctr">
+          <a:solidFill>
+            <a:schemeClr val="phClr"/>
+          </a:solidFill>
+          <a:prstDash val="solid"/>
+          <a:miter lim="800000"/>
+        </a:ln>
+      </a:lnStyleLst>
+      <a:effectStyleLst>
+        <a:effectStyle>
+          <a:effectLst/>
+        </a:effectStyle>
+        <a:effectStyle>
+          <a:effectLst/>
+        </a:effectStyle>
+        <a:effectStyle>
+          <a:effectLst>
+            <a:outerShdw blurRad="57150" dist="19050" dir="5400000" algn="ctr" rotWithShape="0">
+              <a:srgbClr val="000000">
+                <a:alpha val="63000"/>
+              </a:srgbClr>
+            </a:outerShdw>
+          </a:effectLst>
+        </a:effectStyle>
+      </a:effectStyleLst>
+      <a:bgFillStyleLst>
+        <a:solidFill>
+          <a:schemeClr val="phClr"/>
+        </a:solidFill>
+        <a:solidFill>
+          <a:schemeClr val="phClr">
+            <a:tint val="95000"/>
+            <a:satMod val="170000"/>
+          </a:schemeClr>
+        </a:solidFill>
+        <a:gradFill rotWithShape="1">
+          <a:gsLst>
+            <a:gs pos="0">
+              <a:schemeClr val="phClr">
+                <a:tint val="93000"/>
+                <a:satMod val="150000"/>
+                <a:shade val="98000"/>
+                <a:lumMod val="102000"/>
+              </a:schemeClr>
+            </a:gs>
+            <a:gs pos="50000">
+              <a:schemeClr val="phClr">
+                <a:tint val="98000"/>
+                <a:satMod val="130000"/>
+                <a:shade val="90000"/>
+                <a:lumMod val="103000"/>
+              </a:schemeClr>
+            </a:gs>
+            <a:gs pos="100000">
+              <a:schemeClr val="phClr">
+                <a:shade val="63000"/>
+                <a:satMod val="120000"/>
+              </a:schemeClr>
+            </a:gs>
+          </a:gsLst>
+          <a:lin ang="5400000" scaled="0"/>
+        </a:gradFill>
+      </a:bgFillStyleLst>
+    </a:fmtScheme>
+  </a:themeElements>
+  <a:objectDefaults/>
+  <a:extraClrSchemeLst/>
+  <a:extLst>
+    <a:ext uri="{05A4C25C-085E-4340-85A3-A5531E510DB2}">
+      <thm15:themeFamily xmlns:thm15="http://schemas.microsoft.com/office/thememl/2012/main" name="Office Theme" id="{62F939B6-93AF-4DB8-9C6B-D6C7DFDC589F}" vid="{4A3C46E8-61CC-4603-A589-7422A47A8E4A}"/>
+    </a:ext>
+  </a:extLst>
+</a:theme>
 </file>
</xml_diff>

<commit_message>
suite travail sur l'ecran de connexion et sur l'affichage des clients du conseiller + tentative d'ajout d'une fonctionalite de modification d'un client
</commit_message>
<xml_diff>
--- a/SCRUM/Présentation.pptx
+++ b/SCRUM/Présentation.pptx
@@ -218,7 +218,7 @@
           <a:p>
             <a:fld id="{2A84F088-5717-486C-8E6E-59BA7D1B1ECD}" type="datetimeFigureOut">
               <a:rPr lang="fr-FR" smtClean="0"/>
-              <a:t>20/04/2018</a:t>
+              <a:t>26/04/2018</a:t>
             </a:fld>
             <a:endParaRPr lang="fr-FR"/>
           </a:p>
@@ -751,7 +751,7 @@
           <a:p>
             <a:fld id="{7F9A181B-6CE7-45B0-8E1B-330B96C63856}" type="datetime1">
               <a:rPr lang="fr-FR" smtClean="0"/>
-              <a:t>20/04/2018</a:t>
+              <a:t>26/04/2018</a:t>
             </a:fld>
             <a:endParaRPr lang="fr-BE"/>
           </a:p>
@@ -916,7 +916,7 @@
           <a:p>
             <a:fld id="{02276D55-FD39-4BAF-8E70-A3A294E73351}" type="datetime1">
               <a:rPr lang="fr-FR" smtClean="0"/>
-              <a:t>20/04/2018</a:t>
+              <a:t>26/04/2018</a:t>
             </a:fld>
             <a:endParaRPr lang="fr-BE"/>
           </a:p>
@@ -1091,7 +1091,7 @@
           <a:p>
             <a:fld id="{359E71CC-A4F5-4608-AA9C-DF10A98FB406}" type="datetime1">
               <a:rPr lang="fr-FR" smtClean="0"/>
-              <a:t>20/04/2018</a:t>
+              <a:t>26/04/2018</a:t>
             </a:fld>
             <a:endParaRPr lang="fr-BE"/>
           </a:p>
@@ -1256,7 +1256,7 @@
           <a:p>
             <a:fld id="{C15DD3D0-7071-4515-801A-0898E32EC5E4}" type="datetime1">
               <a:rPr lang="fr-FR" smtClean="0"/>
-              <a:t>20/04/2018</a:t>
+              <a:t>26/04/2018</a:t>
             </a:fld>
             <a:endParaRPr lang="fr-BE"/>
           </a:p>
@@ -1497,7 +1497,7 @@
           <a:p>
             <a:fld id="{07A4CC2E-27DB-41A2-BB07-36A3A85A50B7}" type="datetime1">
               <a:rPr lang="fr-FR" smtClean="0"/>
-              <a:t>20/04/2018</a:t>
+              <a:t>26/04/2018</a:t>
             </a:fld>
             <a:endParaRPr lang="fr-BE"/>
           </a:p>
@@ -1780,7 +1780,7 @@
           <a:p>
             <a:fld id="{0AE4607D-6CBE-4C8A-92DF-065DA1B9FF11}" type="datetime1">
               <a:rPr lang="fr-FR" smtClean="0"/>
-              <a:t>20/04/2018</a:t>
+              <a:t>26/04/2018</a:t>
             </a:fld>
             <a:endParaRPr lang="fr-BE"/>
           </a:p>
@@ -2197,7 +2197,7 @@
           <a:p>
             <a:fld id="{8D785312-B15D-4AD5-BF02-95D3F67775E0}" type="datetime1">
               <a:rPr lang="fr-FR" smtClean="0"/>
-              <a:t>20/04/2018</a:t>
+              <a:t>26/04/2018</a:t>
             </a:fld>
             <a:endParaRPr lang="fr-BE"/>
           </a:p>
@@ -2310,7 +2310,7 @@
           <a:p>
             <a:fld id="{BB67788A-B3CD-4BEA-AD93-64CE72A8A505}" type="datetime1">
               <a:rPr lang="fr-FR" smtClean="0"/>
-              <a:t>20/04/2018</a:t>
+              <a:t>26/04/2018</a:t>
             </a:fld>
             <a:endParaRPr lang="fr-BE"/>
           </a:p>
@@ -2400,7 +2400,7 @@
           <a:p>
             <a:fld id="{21E33D94-B33C-4FCD-AEF8-C90D52A49442}" type="datetime1">
               <a:rPr lang="fr-FR" smtClean="0"/>
-              <a:t>20/04/2018</a:t>
+              <a:t>26/04/2018</a:t>
             </a:fld>
             <a:endParaRPr lang="fr-BE"/>
           </a:p>
@@ -2672,7 +2672,7 @@
           <a:p>
             <a:fld id="{AAF78AEC-CF4F-466F-8292-94800DBA8939}" type="datetime1">
               <a:rPr lang="fr-FR" smtClean="0"/>
-              <a:t>20/04/2018</a:t>
+              <a:t>26/04/2018</a:t>
             </a:fld>
             <a:endParaRPr lang="fr-BE"/>
           </a:p>
@@ -2920,7 +2920,7 @@
           <a:p>
             <a:fld id="{AAB32EFF-ED77-4B40-8714-2596D55C20C5}" type="datetime1">
               <a:rPr lang="fr-FR" smtClean="0"/>
-              <a:t>20/04/2018</a:t>
+              <a:t>26/04/2018</a:t>
             </a:fld>
             <a:endParaRPr lang="fr-BE"/>
           </a:p>
@@ -2984,20 +2984,22 @@
         <a:gradFill flip="none" rotWithShape="1">
           <a:gsLst>
             <a:gs pos="0">
-              <a:srgbClr val="FFC0FF"/>
+              <a:srgbClr val="C080FF"/>
             </a:gs>
-            <a:gs pos="75000">
+            <a:gs pos="30000">
               <a:schemeClr val="bg1"/>
             </a:gs>
-            <a:gs pos="25000">
+            <a:gs pos="15000">
+              <a:srgbClr val="80C0FF"/>
+            </a:gs>
+            <a:gs pos="100000">
               <a:schemeClr val="bg1"/>
             </a:gs>
-            <a:gs pos="100000">
-              <a:srgbClr val="80FFFF"/>
-            </a:gs>
           </a:gsLst>
-          <a:lin ang="2700000" scaled="1"/>
-          <a:tileRect/>
+          <a:path path="circle">
+            <a:fillToRect t="100000" r="100000"/>
+          </a:path>
+          <a:tileRect l="-100000" b="-100000"/>
         </a:gradFill>
         <a:effectLst/>
       </p:bgPr>
@@ -3146,7 +3148,7 @@
           <a:p>
             <a:fld id="{45AF4F2A-5C23-482C-AA81-203814F94AF2}" type="datetime1">
               <a:rPr lang="fr-FR" smtClean="0"/>
-              <a:t>20/04/2018</a:t>
+              <a:t>26/04/2018</a:t>
             </a:fld>
             <a:endParaRPr lang="fr-BE"/>
           </a:p>
@@ -3551,97 +3553,75 @@
           </a:p>
         </p:txBody>
       </p:sp>
+      <p:sp>
+        <p:nvSpPr>
+          <p:cNvPr id="3" name="Espace réservé du numéro de diapositive 2"/>
+          <p:cNvSpPr>
+            <a:spLocks noGrp="1"/>
+          </p:cNvSpPr>
+          <p:nvPr>
+            <p:ph type="sldNum" sz="quarter" idx="12"/>
+          </p:nvPr>
+        </p:nvSpPr>
+        <p:spPr/>
+        <p:txBody>
+          <a:bodyPr/>
+          <a:lstStyle/>
+          <a:p>
+            <a:fld id="{CF4668DC-857F-487D-BFFA-8C0CA5037977}" type="slidenum">
+              <a:rPr lang="fr-BE" smtClean="0"/>
+              <a:t>1</a:t>
+            </a:fld>
+            <a:endParaRPr lang="fr-BE"/>
+          </a:p>
+        </p:txBody>
+      </p:sp>
       <p:pic>
         <p:nvPicPr>
-          <p:cNvPr id="6" name="Image 5"/>
+          <p:cNvPr id="4" name="Image 3"/>
           <p:cNvPicPr>
             <a:picLocks noChangeAspect="1"/>
           </p:cNvPicPr>
           <p:nvPr/>
         </p:nvPicPr>
         <p:blipFill rotWithShape="1">
-          <a:blip r:embed="rId3" cstate="print">
-            <a:extLst>
-              <a:ext uri="{28A0092B-C50C-407E-A947-70E740481C1C}">
-                <a14:useLocalDpi xmlns:a14="http://schemas.microsoft.com/office/drawing/2010/main" val="0"/>
-              </a:ext>
-            </a:extLst>
-          </a:blip>
-          <a:srcRect r="60237" b="14629"/>
+          <a:blip r:embed="rId3"/>
+          <a:srcRect l="394" t="6300" r="84333" b="67100"/>
           <a:stretch/>
         </p:blipFill>
         <p:spPr>
           <a:xfrm>
             <a:off x="0" y="0"/>
-            <a:ext cx="1835696" cy="1842679"/>
+            <a:ext cx="2793104" cy="2736304"/>
           </a:xfrm>
           <a:prstGeom prst="rect">
             <a:avLst/>
           </a:prstGeom>
-          <a:ln>
-            <a:solidFill>
-              <a:schemeClr val="tx1"/>
-            </a:solidFill>
-          </a:ln>
         </p:spPr>
       </p:pic>
       <p:pic>
         <p:nvPicPr>
-          <p:cNvPr id="8" name="Image 7"/>
+          <p:cNvPr id="5" name="Image 4"/>
           <p:cNvPicPr>
             <a:picLocks noChangeAspect="1"/>
           </p:cNvPicPr>
           <p:nvPr/>
         </p:nvPicPr>
         <p:blipFill rotWithShape="1">
-          <a:blip r:embed="rId3">
-            <a:extLst>
-              <a:ext uri="{28A0092B-C50C-407E-A947-70E740481C1C}">
-                <a14:useLocalDpi xmlns:a14="http://schemas.microsoft.com/office/drawing/2010/main" val="0"/>
-              </a:ext>
-            </a:extLst>
-          </a:blip>
-          <a:srcRect l="57087" t="21366" r="11413" b="11260"/>
+          <a:blip r:embed="rId4"/>
+          <a:srcRect t="6300" r="77870" b="53800"/>
           <a:stretch/>
         </p:blipFill>
         <p:spPr>
           <a:xfrm>
-            <a:off x="7301320" y="0"/>
-            <a:ext cx="1842680" cy="1842680"/>
+            <a:off x="6360346" y="0"/>
+            <a:ext cx="2783654" cy="2823071"/>
           </a:xfrm>
           <a:prstGeom prst="rect">
             <a:avLst/>
           </a:prstGeom>
-          <a:ln>
-            <a:solidFill>
-              <a:schemeClr val="tx1"/>
-            </a:solidFill>
-          </a:ln>
         </p:spPr>
       </p:pic>
-      <p:sp>
-        <p:nvSpPr>
-          <p:cNvPr id="3" name="Espace réservé du numéro de diapositive 2"/>
-          <p:cNvSpPr>
-            <a:spLocks noGrp="1"/>
-          </p:cNvSpPr>
-          <p:nvPr>
-            <p:ph type="sldNum" sz="quarter" idx="12"/>
-          </p:nvPr>
-        </p:nvSpPr>
-        <p:spPr/>
-        <p:txBody>
-          <a:bodyPr/>
-          <a:lstStyle/>
-          <a:p>
-            <a:fld id="{CF4668DC-857F-487D-BFFA-8C0CA5037977}" type="slidenum">
-              <a:rPr lang="fr-BE" smtClean="0"/>
-              <a:t>1</a:t>
-            </a:fld>
-            <a:endParaRPr lang="fr-BE"/>
-          </a:p>
-        </p:txBody>
-      </p:sp>
     </p:spTree>
     <p:extLst>
       <p:ext uri="{BB962C8B-B14F-4D97-AF65-F5344CB8AC3E}">
@@ -5186,63 +5166,52 @@
           </a:p>
         </p:txBody>
       </p:sp>
+      <p:sp>
+        <p:nvSpPr>
+          <p:cNvPr id="6" name="Espace réservé du numéro de diapositive 5"/>
+          <p:cNvSpPr>
+            <a:spLocks noGrp="1"/>
+          </p:cNvSpPr>
+          <p:nvPr>
+            <p:ph type="sldNum" sz="quarter" idx="12"/>
+          </p:nvPr>
+        </p:nvSpPr>
+        <p:spPr/>
+        <p:txBody>
+          <a:bodyPr/>
+          <a:lstStyle/>
+          <a:p>
+            <a:fld id="{CF4668DC-857F-487D-BFFA-8C0CA5037977}" type="slidenum">
+              <a:rPr lang="fr-BE" smtClean="0"/>
+              <a:t>3</a:t>
+            </a:fld>
+            <a:endParaRPr lang="fr-BE"/>
+          </a:p>
+        </p:txBody>
+      </p:sp>
       <p:pic>
         <p:nvPicPr>
-          <p:cNvPr id="5" name="Image 4"/>
+          <p:cNvPr id="7" name="Image 6"/>
           <p:cNvPicPr>
             <a:picLocks noChangeAspect="1"/>
           </p:cNvPicPr>
           <p:nvPr/>
         </p:nvPicPr>
         <p:blipFill rotWithShape="1">
-          <a:blip r:embed="rId2" cstate="print">
-            <a:extLst>
-              <a:ext uri="{28A0092B-C50C-407E-A947-70E740481C1C}">
-                <a14:useLocalDpi xmlns:a14="http://schemas.microsoft.com/office/drawing/2010/main" val="0"/>
-              </a:ext>
-            </a:extLst>
-          </a:blip>
-          <a:srcRect r="60237" b="14629"/>
+          <a:blip r:embed="rId2"/>
+          <a:srcRect l="394" t="6300" r="84333" b="67100"/>
           <a:stretch/>
         </p:blipFill>
         <p:spPr>
           <a:xfrm>
-            <a:off x="4572000" y="1715572"/>
-            <a:ext cx="3312368" cy="3324968"/>
+            <a:off x="5317632" y="1600200"/>
+            <a:ext cx="2793104" cy="2736304"/>
           </a:xfrm>
           <a:prstGeom prst="rect">
             <a:avLst/>
           </a:prstGeom>
-          <a:ln>
-            <a:solidFill>
-              <a:schemeClr val="tx1"/>
-            </a:solidFill>
-          </a:ln>
         </p:spPr>
       </p:pic>
-      <p:sp>
-        <p:nvSpPr>
-          <p:cNvPr id="6" name="Espace réservé du numéro de diapositive 5"/>
-          <p:cNvSpPr>
-            <a:spLocks noGrp="1"/>
-          </p:cNvSpPr>
-          <p:nvPr>
-            <p:ph type="sldNum" sz="quarter" idx="12"/>
-          </p:nvPr>
-        </p:nvSpPr>
-        <p:spPr/>
-        <p:txBody>
-          <a:bodyPr/>
-          <a:lstStyle/>
-          <a:p>
-            <a:fld id="{CF4668DC-857F-487D-BFFA-8C0CA5037977}" type="slidenum">
-              <a:rPr lang="fr-BE" smtClean="0"/>
-              <a:t>3</a:t>
-            </a:fld>
-            <a:endParaRPr lang="fr-BE"/>
-          </a:p>
-        </p:txBody>
-      </p:sp>
     </p:spTree>
     <p:extLst>
       <p:ext uri="{BB962C8B-B14F-4D97-AF65-F5344CB8AC3E}">
@@ -5557,13 +5526,8 @@
             </a:pPr>
             <a:r>
               <a:rPr lang="fr-FR" dirty="0" smtClean="0"/>
-              <a:t>Automatisation de certaines </a:t>
-            </a:r>
-            <a:r>
-              <a:rPr lang="fr-FR" dirty="0" smtClean="0"/>
-              <a:t>tâches</a:t>
-            </a:r>
-            <a:endParaRPr lang="fr-FR" dirty="0" smtClean="0"/>
+              <a:t>Automatisation de certaines tâches</a:t>
+            </a:r>
           </a:p>
           <a:p>
             <a:pPr marL="285750" indent="-285750">
@@ -5572,11 +5536,7 @@
             </a:pPr>
             <a:r>
               <a:rPr lang="fr-FR" dirty="0" smtClean="0"/>
-              <a:t>Pérennisation et sécurisation des </a:t>
-            </a:r>
-            <a:r>
-              <a:rPr lang="fr-FR" dirty="0" smtClean="0"/>
-              <a:t>données</a:t>
+              <a:t>Pérennisation et sécurisation des données</a:t>
             </a:r>
           </a:p>
           <a:p>
@@ -5614,7 +5574,6 @@
               <a:rPr lang="fr-FR" dirty="0" smtClean="0"/>
               <a:t>nouveaux clients</a:t>
             </a:r>
-            <a:endParaRPr lang="fr-FR" dirty="0" smtClean="0"/>
           </a:p>
           <a:p>
             <a:pPr marL="285750" indent="-285750">
@@ -5633,77 +5592,58 @@
           <a:p>
             <a:r>
               <a:rPr lang="fr-FR" dirty="0" smtClean="0"/>
-              <a:t>1 </a:t>
-            </a:r>
-            <a:r>
-              <a:rPr lang="fr-FR" dirty="0" smtClean="0"/>
-              <a:t>release le 26/04/2018 avec les premières </a:t>
-            </a:r>
-            <a:r>
-              <a:rPr lang="fr-FR" dirty="0" smtClean="0"/>
-              <a:t>fonctionnalités</a:t>
+              <a:t>1 release le 26/04/2018 avec les premières fonctionnalités</a:t>
             </a:r>
             <a:endParaRPr lang="fr-FR" dirty="0"/>
+          </a:p>
+        </p:txBody>
+      </p:sp>
+      <p:sp>
+        <p:nvSpPr>
+          <p:cNvPr id="6" name="Espace réservé du numéro de diapositive 5"/>
+          <p:cNvSpPr>
+            <a:spLocks noGrp="1"/>
+          </p:cNvSpPr>
+          <p:nvPr>
+            <p:ph type="sldNum" sz="quarter" idx="12"/>
+          </p:nvPr>
+        </p:nvSpPr>
+        <p:spPr/>
+        <p:txBody>
+          <a:bodyPr/>
+          <a:lstStyle/>
+          <a:p>
+            <a:fld id="{CF4668DC-857F-487D-BFFA-8C0CA5037977}" type="slidenum">
+              <a:rPr lang="fr-BE" smtClean="0"/>
+              <a:t>5</a:t>
+            </a:fld>
+            <a:endParaRPr lang="fr-BE"/>
           </a:p>
         </p:txBody>
       </p:sp>
       <p:pic>
         <p:nvPicPr>
-          <p:cNvPr id="5" name="Image 4"/>
+          <p:cNvPr id="7" name="Image 6"/>
           <p:cNvPicPr>
             <a:picLocks noChangeAspect="1"/>
           </p:cNvPicPr>
           <p:nvPr/>
         </p:nvPicPr>
         <p:blipFill rotWithShape="1">
-          <a:blip r:embed="rId2">
-            <a:extLst>
-              <a:ext uri="{28A0092B-C50C-407E-A947-70E740481C1C}">
-                <a14:useLocalDpi xmlns:a14="http://schemas.microsoft.com/office/drawing/2010/main" val="0"/>
-              </a:ext>
-            </a:extLst>
-          </a:blip>
-          <a:srcRect l="57087" t="21366" r="11413" b="11260"/>
+          <a:blip r:embed="rId2"/>
+          <a:srcRect t="6300" r="77870" b="53800"/>
           <a:stretch/>
         </p:blipFill>
         <p:spPr>
           <a:xfrm>
-            <a:off x="6844120" y="2086893"/>
-            <a:ext cx="1842680" cy="1842680"/>
+            <a:off x="5724128" y="1484784"/>
+            <a:ext cx="2783654" cy="2823071"/>
           </a:xfrm>
           <a:prstGeom prst="rect">
             <a:avLst/>
           </a:prstGeom>
-          <a:ln>
-            <a:solidFill>
-              <a:schemeClr val="tx1"/>
-            </a:solidFill>
-          </a:ln>
         </p:spPr>
       </p:pic>
-      <p:sp>
-        <p:nvSpPr>
-          <p:cNvPr id="6" name="Espace réservé du numéro de diapositive 5"/>
-          <p:cNvSpPr>
-            <a:spLocks noGrp="1"/>
-          </p:cNvSpPr>
-          <p:nvPr>
-            <p:ph type="sldNum" sz="quarter" idx="12"/>
-          </p:nvPr>
-        </p:nvSpPr>
-        <p:spPr/>
-        <p:txBody>
-          <a:bodyPr/>
-          <a:lstStyle/>
-          <a:p>
-            <a:fld id="{CF4668DC-857F-487D-BFFA-8C0CA5037977}" type="slidenum">
-              <a:rPr lang="fr-BE" smtClean="0"/>
-              <a:t>5</a:t>
-            </a:fld>
-            <a:endParaRPr lang="fr-BE"/>
-          </a:p>
-        </p:txBody>
-      </p:sp>
     </p:spTree>
     <p:extLst>
       <p:ext uri="{BB962C8B-B14F-4D97-AF65-F5344CB8AC3E}">

</xml_diff>